<commit_message>
Cambios en la presentación.
</commit_message>
<xml_diff>
--- a/Docs/Introducción a los Gráficos 3D.pptx
+++ b/Docs/Introducción a los Gráficos 3D.pptx
@@ -2,7 +2,7 @@
 <file path=ppt/presentation.xml><?xml version="1.0" encoding="utf-8"?>
 <p:presentation xmlns:a="http://schemas.openxmlformats.org/drawingml/2006/main" xmlns:r="http://schemas.openxmlformats.org/officeDocument/2006/relationships" xmlns:p="http://schemas.openxmlformats.org/presentationml/2006/main" saveSubsetFonts="1">
   <p:sldMasterIdLst>
-    <p:sldMasterId id="2147483648" r:id="rId1"/>
+    <p:sldMasterId id="2147483708" r:id="rId1"/>
   </p:sldMasterIdLst>
   <p:sldIdLst>
     <p:sldId id="256" r:id="rId2"/>
@@ -12,6 +12,13 @@
     <p:sldId id="260" r:id="rId6"/>
     <p:sldId id="261" r:id="rId7"/>
     <p:sldId id="262" r:id="rId8"/>
+    <p:sldId id="265" r:id="rId9"/>
+    <p:sldId id="268" r:id="rId10"/>
+    <p:sldId id="266" r:id="rId11"/>
+    <p:sldId id="267" r:id="rId12"/>
+    <p:sldId id="269" r:id="rId13"/>
+    <p:sldId id="263" r:id="rId14"/>
+    <p:sldId id="264" r:id="rId15"/>
   </p:sldIdLst>
   <p:sldSz cx="9144000" cy="6858000" type="screen4x3"/>
   <p:notesSz cx="6858000" cy="9144000"/>
@@ -114,8 +121,13 @@
 </file>
 
 <file path=ppt/slideLayouts/slideLayout1.xml><?xml version="1.0" encoding="utf-8"?>
-<p:sldLayout xmlns:a="http://schemas.openxmlformats.org/drawingml/2006/main" xmlns:r="http://schemas.openxmlformats.org/officeDocument/2006/relationships" xmlns:p="http://schemas.openxmlformats.org/presentationml/2006/main" type="title" preserve="1">
+<p:sldLayout xmlns:a="http://schemas.openxmlformats.org/drawingml/2006/main" xmlns:r="http://schemas.openxmlformats.org/officeDocument/2006/relationships" xmlns:p="http://schemas.openxmlformats.org/presentationml/2006/main" showMasterSp="0" type="title" preserve="1">
   <p:cSld name="Title Slide">
+    <p:bg>
+      <p:bgRef idx="1002">
+        <a:schemeClr val="bg2"/>
+      </p:bgRef>
+    </p:bg>
     <p:spTree>
       <p:nvGrpSpPr>
         <p:cNvPr id="1" name=""/>
@@ -132,7 +144,203 @@
       </p:grpSpPr>
       <p:sp>
         <p:nvSpPr>
-          <p:cNvPr id="2" name="Title 1"/>
+          <p:cNvPr id="7" name="Freeform 6"/>
+          <p:cNvSpPr>
+            <a:spLocks/>
+          </p:cNvSpPr>
+          <p:nvPr/>
+        </p:nvSpPr>
+        <p:spPr bwMode="auto">
+          <a:xfrm>
+            <a:off x="0" y="4752126"/>
+            <a:ext cx="9144000" cy="2112962"/>
+          </a:xfrm>
+          <a:custGeom>
+            <a:avLst>
+              <a:gd name="A1" fmla="val 0"/>
+              <a:gd name="A2" fmla="val 0"/>
+              <a:gd name="A3" fmla="val 0"/>
+              <a:gd name="A4" fmla="val 0"/>
+              <a:gd name="A5" fmla="val 0"/>
+              <a:gd name="A6" fmla="val 0"/>
+              <a:gd name="A7" fmla="val 0"/>
+              <a:gd name="A8" fmla="val 0"/>
+            </a:avLst>
+            <a:gdLst/>
+            <a:ahLst/>
+            <a:cxnLst>
+              <a:cxn ang="0">
+                <a:pos x="0" y="1066"/>
+              </a:cxn>
+              <a:cxn ang="0">
+                <a:pos x="0" y="1331"/>
+              </a:cxn>
+              <a:cxn ang="0">
+                <a:pos x="5760" y="1331"/>
+              </a:cxn>
+              <a:cxn ang="0">
+                <a:pos x="5760" y="0"/>
+              </a:cxn>
+              <a:cxn ang="0">
+                <a:pos x="0" y="1066"/>
+              </a:cxn>
+            </a:cxnLst>
+            <a:rect l="0" t="0" r="0" b="0"/>
+            <a:pathLst>
+              <a:path w="5760" h="1331">
+                <a:moveTo>
+                  <a:pt x="0" y="1066"/>
+                </a:moveTo>
+                <a:lnTo>
+                  <a:pt x="0" y="1331"/>
+                </a:lnTo>
+                <a:lnTo>
+                  <a:pt x="5760" y="1331"/>
+                </a:lnTo>
+                <a:lnTo>
+                  <a:pt x="5760" y="0"/>
+                </a:lnTo>
+                <a:cubicBezTo>
+                  <a:pt x="3220" y="1206"/>
+                  <a:pt x="2250" y="1146"/>
+                  <a:pt x="0" y="1066"/>
+                </a:cubicBezTo>
+                <a:close/>
+              </a:path>
+            </a:pathLst>
+          </a:custGeom>
+          <a:solidFill>
+            <a:schemeClr val="bg1">
+              <a:tint val="80000"/>
+              <a:satMod val="200000"/>
+              <a:alpha val="45000"/>
+            </a:schemeClr>
+          </a:solidFill>
+          <a:ln w="9525" cap="flat" cmpd="sng" algn="ctr">
+            <a:noFill/>
+            <a:prstDash val="solid"/>
+            <a:round/>
+            <a:headEnd type="none" w="med" len="med"/>
+            <a:tailEnd type="none" w="med" len="med"/>
+          </a:ln>
+          <a:effectLst>
+            <a:outerShdw blurRad="50800" dist="44450" dir="16200000" algn="ctr" rotWithShape="0">
+              <a:prstClr val="black">
+                <a:alpha val="35000"/>
+              </a:prstClr>
+            </a:outerShdw>
+          </a:effectLst>
+        </p:spPr>
+        <p:txBody>
+          <a:bodyPr vert="horz" wrap="square" lIns="91440" tIns="45720" rIns="91440" bIns="45720" anchor="t" compatLnSpc="1"/>
+          <a:lstStyle/>
+          <a:p>
+            <a:endParaRPr kumimoji="0" lang="en-US"/>
+          </a:p>
+        </p:txBody>
+      </p:sp>
+      <p:sp>
+        <p:nvSpPr>
+          <p:cNvPr id="8" name="Freeform 7"/>
+          <p:cNvSpPr>
+            <a:spLocks/>
+          </p:cNvSpPr>
+          <p:nvPr/>
+        </p:nvSpPr>
+        <p:spPr bwMode="auto">
+          <a:xfrm>
+            <a:off x="6105525" y="0"/>
+            <a:ext cx="3038475" cy="6858000"/>
+          </a:xfrm>
+          <a:custGeom>
+            <a:avLst/>
+            <a:gdLst>
+              <a:gd name="connsiteX0" fmla="*/ 1914 w 1914"/>
+              <a:gd name="connsiteY0" fmla="*/ 9 h 4329"/>
+              <a:gd name="connsiteX1" fmla="*/ 1914 w 1914"/>
+              <a:gd name="connsiteY1" fmla="*/ 4329 h 4329"/>
+              <a:gd name="connsiteX2" fmla="*/ 204 w 1914"/>
+              <a:gd name="connsiteY2" fmla="*/ 4327 h 4329"/>
+              <a:gd name="connsiteX3" fmla="*/ 0 w 1914"/>
+              <a:gd name="connsiteY3" fmla="*/ 0 h 4329"/>
+              <a:gd name="connsiteX4" fmla="*/ 1914 w 1914"/>
+              <a:gd name="connsiteY4" fmla="*/ 9 h 4329"/>
+            </a:gdLst>
+            <a:ahLst/>
+            <a:cxnLst>
+              <a:cxn ang="0">
+                <a:pos x="connsiteX0" y="connsiteY0"/>
+              </a:cxn>
+              <a:cxn ang="0">
+                <a:pos x="connsiteX1" y="connsiteY1"/>
+              </a:cxn>
+              <a:cxn ang="0">
+                <a:pos x="connsiteX2" y="connsiteY2"/>
+              </a:cxn>
+              <a:cxn ang="0">
+                <a:pos x="connsiteX3" y="connsiteY3"/>
+              </a:cxn>
+              <a:cxn ang="0">
+                <a:pos x="connsiteX4" y="connsiteY4"/>
+              </a:cxn>
+            </a:cxnLst>
+            <a:rect l="l" t="t" r="r" b="b"/>
+            <a:pathLst>
+              <a:path w="1914" h="4329">
+                <a:moveTo>
+                  <a:pt x="1914" y="9"/>
+                </a:moveTo>
+                <a:lnTo>
+                  <a:pt x="1914" y="4329"/>
+                </a:lnTo>
+                <a:lnTo>
+                  <a:pt x="204" y="4327"/>
+                </a:lnTo>
+                <a:cubicBezTo>
+                  <a:pt x="1288" y="3574"/>
+                  <a:pt x="1608" y="1590"/>
+                  <a:pt x="0" y="0"/>
+                </a:cubicBezTo>
+                <a:lnTo>
+                  <a:pt x="1914" y="9"/>
+                </a:lnTo>
+                <a:close/>
+              </a:path>
+            </a:pathLst>
+          </a:custGeom>
+          <a:solidFill>
+            <a:schemeClr val="bg1">
+              <a:tint val="90000"/>
+              <a:satMod val="350000"/>
+              <a:alpha val="40000"/>
+            </a:schemeClr>
+          </a:solidFill>
+          <a:ln w="9525" cap="flat" cmpd="sng" algn="ctr">
+            <a:noFill/>
+            <a:prstDash val="solid"/>
+            <a:round/>
+            <a:headEnd type="none" w="med" len="med"/>
+            <a:tailEnd type="none" w="med" len="med"/>
+          </a:ln>
+          <a:effectLst>
+            <a:outerShdw blurRad="50800" dist="50800" dir="10800000" algn="ctr" rotWithShape="0">
+              <a:prstClr val="black">
+                <a:alpha val="45000"/>
+              </a:prstClr>
+            </a:outerShdw>
+          </a:effectLst>
+        </p:spPr>
+        <p:txBody>
+          <a:bodyPr vert="horz" wrap="square" lIns="91440" tIns="45720" rIns="91440" bIns="45720" anchor="t" compatLnSpc="1"/>
+          <a:lstStyle/>
+          <a:p>
+            <a:endParaRPr kumimoji="0" lang="en-US"/>
+          </a:p>
+        </p:txBody>
+      </p:sp>
+      <p:sp>
+        <p:nvSpPr>
+          <p:cNvPr id="9" name="Title 8"/>
           <p:cNvSpPr>
             <a:spLocks noGrp="1"/>
           </p:cNvSpPr>
@@ -142,25 +350,82 @@
         </p:nvSpPr>
         <p:spPr>
           <a:xfrm>
-            <a:off x="685800" y="2130425"/>
-            <a:ext cx="7772400" cy="1470025"/>
+            <a:off x="429064" y="3337560"/>
+            <a:ext cx="6480048" cy="2301240"/>
           </a:xfrm>
         </p:spPr>
         <p:txBody>
-          <a:bodyPr/>
-          <a:lstStyle/>
-          <a:p>
-            <a:r>
-              <a:rPr lang="en-US" smtClean="0"/>
+          <a:bodyPr rIns="45720" anchor="t"/>
+          <a:lstStyle>
+            <a:lvl1pPr algn="r">
+              <a:defRPr lang="en-US" b="1" cap="all" baseline="0" dirty="0">
+                <a:ln w="5000" cmpd="sng">
+                  <a:solidFill>
+                    <a:schemeClr val="accent1">
+                      <a:tint val="80000"/>
+                      <a:shade val="99000"/>
+                      <a:satMod val="500000"/>
+                    </a:schemeClr>
+                  </a:solidFill>
+                  <a:prstDash val="solid"/>
+                </a:ln>
+                <a:gradFill>
+                  <a:gsLst>
+                    <a:gs pos="0">
+                      <a:schemeClr val="accent1">
+                        <a:tint val="63000"/>
+                        <a:satMod val="255000"/>
+                      </a:schemeClr>
+                    </a:gs>
+                    <a:gs pos="9000">
+                      <a:schemeClr val="accent1">
+                        <a:tint val="63000"/>
+                        <a:satMod val="255000"/>
+                      </a:schemeClr>
+                    </a:gs>
+                    <a:gs pos="53000">
+                      <a:schemeClr val="accent1">
+                        <a:shade val="60000"/>
+                        <a:satMod val="100000"/>
+                      </a:schemeClr>
+                    </a:gs>
+                    <a:gs pos="90000">
+                      <a:schemeClr val="accent1">
+                        <a:tint val="63000"/>
+                        <a:satMod val="255000"/>
+                      </a:schemeClr>
+                    </a:gs>
+                    <a:gs pos="100000">
+                      <a:schemeClr val="accent1">
+                        <a:tint val="63000"/>
+                        <a:satMod val="255000"/>
+                      </a:schemeClr>
+                    </a:gs>
+                  </a:gsLst>
+                  <a:lin ang="5400000"/>
+                </a:gradFill>
+                <a:effectLst>
+                  <a:outerShdw blurRad="50800" dist="38100" dir="5400000" algn="t" rotWithShape="0">
+                    <a:prstClr val="black">
+                      <a:alpha val="50000"/>
+                    </a:prstClr>
+                  </a:outerShdw>
+                </a:effectLst>
+              </a:defRPr>
+            </a:lvl1pPr>
+          </a:lstStyle>
+          <a:p>
+            <a:r>
+              <a:rPr kumimoji="0" lang="en-US" smtClean="0"/>
               <a:t>Click to edit Master title style</a:t>
             </a:r>
-            <a:endParaRPr lang="en-US"/>
-          </a:p>
-        </p:txBody>
-      </p:sp>
-      <p:sp>
-        <p:nvSpPr>
-          <p:cNvPr id="3" name="Subtitle 2"/>
+            <a:endParaRPr kumimoji="0" lang="en-US"/>
+          </a:p>
+        </p:txBody>
+      </p:sp>
+      <p:sp>
+        <p:nvSpPr>
+          <p:cNvPr id="17" name="Subtitle 16"/>
           <p:cNvSpPr>
             <a:spLocks noGrp="1"/>
           </p:cNvSpPr>
@@ -170,116 +435,61 @@
         </p:nvSpPr>
         <p:spPr>
           <a:xfrm>
-            <a:off x="1371600" y="3886200"/>
-            <a:ext cx="6400800" cy="1752600"/>
+            <a:off x="433050" y="1544812"/>
+            <a:ext cx="6480048" cy="1752600"/>
           </a:xfrm>
         </p:spPr>
         <p:txBody>
-          <a:bodyPr/>
+          <a:bodyPr tIns="0" rIns="45720" bIns="0" anchor="b">
+            <a:normAutofit/>
+          </a:bodyPr>
           <a:lstStyle>
-            <a:lvl1pPr marL="0" indent="0" algn="ctr">
+            <a:lvl1pPr marL="0" indent="0" algn="r">
               <a:buNone/>
-              <a:defRPr>
+              <a:defRPr sz="2000">
                 <a:solidFill>
-                  <a:schemeClr val="tx1">
-                    <a:tint val="75000"/>
-                  </a:schemeClr>
+                  <a:schemeClr val="tx1"/>
                 </a:solidFill>
+                <a:effectLst/>
               </a:defRPr>
             </a:lvl1pPr>
             <a:lvl2pPr marL="457200" indent="0" algn="ctr">
               <a:buNone/>
-              <a:defRPr>
-                <a:solidFill>
-                  <a:schemeClr val="tx1">
-                    <a:tint val="75000"/>
-                  </a:schemeClr>
-                </a:solidFill>
-              </a:defRPr>
             </a:lvl2pPr>
             <a:lvl3pPr marL="914400" indent="0" algn="ctr">
               <a:buNone/>
-              <a:defRPr>
-                <a:solidFill>
-                  <a:schemeClr val="tx1">
-                    <a:tint val="75000"/>
-                  </a:schemeClr>
-                </a:solidFill>
-              </a:defRPr>
             </a:lvl3pPr>
             <a:lvl4pPr marL="1371600" indent="0" algn="ctr">
               <a:buNone/>
-              <a:defRPr>
-                <a:solidFill>
-                  <a:schemeClr val="tx1">
-                    <a:tint val="75000"/>
-                  </a:schemeClr>
-                </a:solidFill>
-              </a:defRPr>
             </a:lvl4pPr>
             <a:lvl5pPr marL="1828800" indent="0" algn="ctr">
               <a:buNone/>
-              <a:defRPr>
-                <a:solidFill>
-                  <a:schemeClr val="tx1">
-                    <a:tint val="75000"/>
-                  </a:schemeClr>
-                </a:solidFill>
-              </a:defRPr>
             </a:lvl5pPr>
             <a:lvl6pPr marL="2286000" indent="0" algn="ctr">
               <a:buNone/>
-              <a:defRPr>
-                <a:solidFill>
-                  <a:schemeClr val="tx1">
-                    <a:tint val="75000"/>
-                  </a:schemeClr>
-                </a:solidFill>
-              </a:defRPr>
             </a:lvl6pPr>
             <a:lvl7pPr marL="2743200" indent="0" algn="ctr">
               <a:buNone/>
-              <a:defRPr>
-                <a:solidFill>
-                  <a:schemeClr val="tx1">
-                    <a:tint val="75000"/>
-                  </a:schemeClr>
-                </a:solidFill>
-              </a:defRPr>
             </a:lvl7pPr>
             <a:lvl8pPr marL="3200400" indent="0" algn="ctr">
               <a:buNone/>
-              <a:defRPr>
-                <a:solidFill>
-                  <a:schemeClr val="tx1">
-                    <a:tint val="75000"/>
-                  </a:schemeClr>
-                </a:solidFill>
-              </a:defRPr>
             </a:lvl8pPr>
             <a:lvl9pPr marL="3657600" indent="0" algn="ctr">
               <a:buNone/>
-              <a:defRPr>
-                <a:solidFill>
-                  <a:schemeClr val="tx1">
-                    <a:tint val="75000"/>
-                  </a:schemeClr>
-                </a:solidFill>
-              </a:defRPr>
             </a:lvl9pPr>
           </a:lstStyle>
           <a:p>
             <a:r>
-              <a:rPr lang="en-US" smtClean="0"/>
+              <a:rPr kumimoji="0" lang="en-US" smtClean="0"/>
               <a:t>Click to edit Master subtitle style</a:t>
             </a:r>
-            <a:endParaRPr lang="en-US"/>
-          </a:p>
-        </p:txBody>
-      </p:sp>
-      <p:sp>
-        <p:nvSpPr>
-          <p:cNvPr id="4" name="Date Placeholder 3"/>
+            <a:endParaRPr kumimoji="0" lang="en-US"/>
+          </a:p>
+        </p:txBody>
+      </p:sp>
+      <p:sp>
+        <p:nvSpPr>
+          <p:cNvPr id="30" name="Date Placeholder 29"/>
           <p:cNvSpPr>
             <a:spLocks noGrp="1"/>
           </p:cNvSpPr>
@@ -302,7 +512,7 @@
       </p:sp>
       <p:sp>
         <p:nvSpPr>
-          <p:cNvPr id="5" name="Footer Placeholder 4"/>
+          <p:cNvPr id="19" name="Footer Placeholder 18"/>
           <p:cNvSpPr>
             <a:spLocks noGrp="1"/>
           </p:cNvSpPr>
@@ -321,7 +531,7 @@
       </p:sp>
       <p:sp>
         <p:nvSpPr>
-          <p:cNvPr id="6" name="Slide Number Placeholder 5"/>
+          <p:cNvPr id="27" name="Slide Number Placeholder 26"/>
           <p:cNvSpPr>
             <a:spLocks noGrp="1"/>
           </p:cNvSpPr>
@@ -343,14 +553,9 @@
         </p:txBody>
       </p:sp>
     </p:spTree>
-    <p:extLst>
-      <p:ext uri="{BB962C8B-B14F-4D97-AF65-F5344CB8AC3E}">
-        <p14:creationId xmlns:p14="http://schemas.microsoft.com/office/powerpoint/2010/main" val="1777273486"/>
-      </p:ext>
-    </p:extLst>
   </p:cSld>
   <p:clrMapOvr>
-    <a:masterClrMapping/>
+    <a:overrideClrMapping bg1="dk1" tx1="lt1" bg2="dk2" tx2="lt2" accent1="accent1" accent2="accent2" accent3="accent3" accent4="accent4" accent5="accent5" accent6="accent6" hlink="hlink" folHlink="folHlink"/>
   </p:clrMapOvr>
 </p:sldLayout>
 </file>
@@ -388,10 +593,10 @@
           <a:lstStyle/>
           <a:p>
             <a:r>
-              <a:rPr lang="en-US" smtClean="0"/>
+              <a:rPr kumimoji="0" lang="en-US" smtClean="0"/>
               <a:t>Click to edit Master title style</a:t>
             </a:r>
-            <a:endParaRPr lang="en-US"/>
+            <a:endParaRPr kumimoji="0" lang="en-US"/>
           </a:p>
         </p:txBody>
       </p:sp>
@@ -410,40 +615,40 @@
           <a:bodyPr vert="eaVert"/>
           <a:lstStyle/>
           <a:p>
-            <a:pPr lvl="0"/>
+            <a:pPr lvl="0" eaLnBrk="1" latinLnBrk="0" hangingPunct="1"/>
             <a:r>
               <a:rPr lang="en-US" smtClean="0"/>
               <a:t>Click to edit Master text styles</a:t>
             </a:r>
           </a:p>
           <a:p>
-            <a:pPr lvl="1"/>
+            <a:pPr lvl="1" eaLnBrk="1" latinLnBrk="0" hangingPunct="1"/>
             <a:r>
               <a:rPr lang="en-US" smtClean="0"/>
               <a:t>Second level</a:t>
             </a:r>
           </a:p>
           <a:p>
-            <a:pPr lvl="2"/>
+            <a:pPr lvl="2" eaLnBrk="1" latinLnBrk="0" hangingPunct="1"/>
             <a:r>
               <a:rPr lang="en-US" smtClean="0"/>
               <a:t>Third level</a:t>
             </a:r>
           </a:p>
           <a:p>
-            <a:pPr lvl="3"/>
+            <a:pPr lvl="3" eaLnBrk="1" latinLnBrk="0" hangingPunct="1"/>
             <a:r>
               <a:rPr lang="en-US" smtClean="0"/>
               <a:t>Fourth level</a:t>
             </a:r>
           </a:p>
           <a:p>
-            <a:pPr lvl="4"/>
+            <a:pPr lvl="4" eaLnBrk="1" latinLnBrk="0" hangingPunct="1"/>
             <a:r>
               <a:rPr lang="en-US" smtClean="0"/>
               <a:t>Fifth level</a:t>
             </a:r>
-            <a:endParaRPr lang="en-US"/>
+            <a:endParaRPr kumimoji="0" lang="en-US"/>
           </a:p>
         </p:txBody>
       </p:sp>
@@ -513,11 +718,6 @@
         </p:txBody>
       </p:sp>
     </p:spTree>
-    <p:extLst>
-      <p:ext uri="{BB962C8B-B14F-4D97-AF65-F5344CB8AC3E}">
-        <p14:creationId xmlns:p14="http://schemas.microsoft.com/office/powerpoint/2010/main" val="2508115430"/>
-      </p:ext>
-    </p:extLst>
   </p:cSld>
   <p:clrMapOvr>
     <a:masterClrMapping/>
@@ -563,10 +763,10 @@
           <a:lstStyle/>
           <a:p>
             <a:r>
-              <a:rPr lang="en-US" smtClean="0"/>
+              <a:rPr kumimoji="0" lang="en-US" smtClean="0"/>
               <a:t>Click to edit Master title style</a:t>
             </a:r>
-            <a:endParaRPr lang="en-US"/>
+            <a:endParaRPr kumimoji="0" lang="en-US"/>
           </a:p>
         </p:txBody>
       </p:sp>
@@ -590,40 +790,40 @@
           <a:bodyPr vert="eaVert"/>
           <a:lstStyle/>
           <a:p>
-            <a:pPr lvl="0"/>
+            <a:pPr lvl="0" eaLnBrk="1" latinLnBrk="0" hangingPunct="1"/>
             <a:r>
               <a:rPr lang="en-US" smtClean="0"/>
               <a:t>Click to edit Master text styles</a:t>
             </a:r>
           </a:p>
           <a:p>
-            <a:pPr lvl="1"/>
+            <a:pPr lvl="1" eaLnBrk="1" latinLnBrk="0" hangingPunct="1"/>
             <a:r>
               <a:rPr lang="en-US" smtClean="0"/>
               <a:t>Second level</a:t>
             </a:r>
           </a:p>
           <a:p>
-            <a:pPr lvl="2"/>
+            <a:pPr lvl="2" eaLnBrk="1" latinLnBrk="0" hangingPunct="1"/>
             <a:r>
               <a:rPr lang="en-US" smtClean="0"/>
               <a:t>Third level</a:t>
             </a:r>
           </a:p>
           <a:p>
-            <a:pPr lvl="3"/>
+            <a:pPr lvl="3" eaLnBrk="1" latinLnBrk="0" hangingPunct="1"/>
             <a:r>
               <a:rPr lang="en-US" smtClean="0"/>
               <a:t>Fourth level</a:t>
             </a:r>
           </a:p>
           <a:p>
-            <a:pPr lvl="4"/>
+            <a:pPr lvl="4" eaLnBrk="1" latinLnBrk="0" hangingPunct="1"/>
             <a:r>
               <a:rPr lang="en-US" smtClean="0"/>
               <a:t>Fifth level</a:t>
             </a:r>
-            <a:endParaRPr lang="en-US"/>
+            <a:endParaRPr kumimoji="0" lang="en-US"/>
           </a:p>
         </p:txBody>
       </p:sp>
@@ -693,11 +893,6 @@
         </p:txBody>
       </p:sp>
     </p:spTree>
-    <p:extLst>
-      <p:ext uri="{BB962C8B-B14F-4D97-AF65-F5344CB8AC3E}">
-        <p14:creationId xmlns:p14="http://schemas.microsoft.com/office/powerpoint/2010/main" val="3502701978"/>
-      </p:ext>
-    </p:extLst>
   </p:cSld>
   <p:clrMapOvr>
     <a:masterClrMapping/>
@@ -735,13 +930,17 @@
         <p:spPr/>
         <p:txBody>
           <a:bodyPr/>
-          <a:lstStyle/>
-          <a:p>
-            <a:r>
-              <a:rPr lang="en-US" smtClean="0"/>
+          <a:lstStyle>
+            <a:lvl1pPr algn="l">
+              <a:defRPr/>
+            </a:lvl1pPr>
+          </a:lstStyle>
+          <a:p>
+            <a:r>
+              <a:rPr kumimoji="0" lang="en-US" smtClean="0"/>
               <a:t>Click to edit Master title style</a:t>
             </a:r>
-            <a:endParaRPr lang="en-US"/>
+            <a:endParaRPr kumimoji="0" lang="en-US"/>
           </a:p>
         </p:txBody>
       </p:sp>
@@ -760,40 +959,40 @@
           <a:bodyPr/>
           <a:lstStyle/>
           <a:p>
-            <a:pPr lvl="0"/>
+            <a:pPr lvl="0" eaLnBrk="1" latinLnBrk="0" hangingPunct="1"/>
             <a:r>
               <a:rPr lang="en-US" smtClean="0"/>
               <a:t>Click to edit Master text styles</a:t>
             </a:r>
           </a:p>
           <a:p>
-            <a:pPr lvl="1"/>
+            <a:pPr lvl="1" eaLnBrk="1" latinLnBrk="0" hangingPunct="1"/>
             <a:r>
               <a:rPr lang="en-US" smtClean="0"/>
               <a:t>Second level</a:t>
             </a:r>
           </a:p>
           <a:p>
-            <a:pPr lvl="2"/>
+            <a:pPr lvl="2" eaLnBrk="1" latinLnBrk="0" hangingPunct="1"/>
             <a:r>
               <a:rPr lang="en-US" smtClean="0"/>
               <a:t>Third level</a:t>
             </a:r>
           </a:p>
           <a:p>
-            <a:pPr lvl="3"/>
+            <a:pPr lvl="3" eaLnBrk="1" latinLnBrk="0" hangingPunct="1"/>
             <a:r>
               <a:rPr lang="en-US" smtClean="0"/>
               <a:t>Fourth level</a:t>
             </a:r>
           </a:p>
           <a:p>
-            <a:pPr lvl="4"/>
+            <a:pPr lvl="4" eaLnBrk="1" latinLnBrk="0" hangingPunct="1"/>
             <a:r>
               <a:rPr lang="en-US" smtClean="0"/>
               <a:t>Fifth level</a:t>
             </a:r>
-            <a:endParaRPr lang="en-US"/>
+            <a:endParaRPr kumimoji="0" lang="en-US"/>
           </a:p>
         </p:txBody>
       </p:sp>
@@ -863,11 +1062,6 @@
         </p:txBody>
       </p:sp>
     </p:spTree>
-    <p:extLst>
-      <p:ext uri="{BB962C8B-B14F-4D97-AF65-F5344CB8AC3E}">
-        <p14:creationId xmlns:p14="http://schemas.microsoft.com/office/powerpoint/2010/main" val="1364114210"/>
-      </p:ext>
-    </p:extLst>
   </p:cSld>
   <p:clrMapOvr>
     <a:masterClrMapping/>
@@ -876,8 +1070,13 @@
 </file>
 
 <file path=ppt/slideLayouts/slideLayout3.xml><?xml version="1.0" encoding="utf-8"?>
-<p:sldLayout xmlns:a="http://schemas.openxmlformats.org/drawingml/2006/main" xmlns:r="http://schemas.openxmlformats.org/officeDocument/2006/relationships" xmlns:p="http://schemas.openxmlformats.org/presentationml/2006/main" type="secHead" preserve="1">
+<p:sldLayout xmlns:a="http://schemas.openxmlformats.org/drawingml/2006/main" xmlns:r="http://schemas.openxmlformats.org/officeDocument/2006/relationships" xmlns:p="http://schemas.openxmlformats.org/presentationml/2006/main" showMasterSp="0" type="secHead" preserve="1">
   <p:cSld name="Section Header">
+    <p:bg>
+      <p:bgRef idx="1002">
+        <a:schemeClr val="bg2"/>
+      </p:bgRef>
+    </p:bg>
     <p:spTree>
       <p:nvGrpSpPr>
         <p:cNvPr id="1" name=""/>
@@ -894,6 +1093,202 @@
       </p:grpSpPr>
       <p:sp>
         <p:nvSpPr>
+          <p:cNvPr id="7" name="Freeform 6"/>
+          <p:cNvSpPr>
+            <a:spLocks/>
+          </p:cNvSpPr>
+          <p:nvPr/>
+        </p:nvSpPr>
+        <p:spPr bwMode="auto">
+          <a:xfrm>
+            <a:off x="0" y="4752126"/>
+            <a:ext cx="9144000" cy="2112962"/>
+          </a:xfrm>
+          <a:custGeom>
+            <a:avLst>
+              <a:gd name="A1" fmla="val 0"/>
+              <a:gd name="A2" fmla="val 0"/>
+              <a:gd name="A3" fmla="val 0"/>
+              <a:gd name="A4" fmla="val 0"/>
+              <a:gd name="A5" fmla="val 0"/>
+              <a:gd name="A6" fmla="val 0"/>
+              <a:gd name="A7" fmla="val 0"/>
+              <a:gd name="A8" fmla="val 0"/>
+            </a:avLst>
+            <a:gdLst/>
+            <a:ahLst/>
+            <a:cxnLst>
+              <a:cxn ang="0">
+                <a:pos x="0" y="1066"/>
+              </a:cxn>
+              <a:cxn ang="0">
+                <a:pos x="0" y="1331"/>
+              </a:cxn>
+              <a:cxn ang="0">
+                <a:pos x="5760" y="1331"/>
+              </a:cxn>
+              <a:cxn ang="0">
+                <a:pos x="5760" y="0"/>
+              </a:cxn>
+              <a:cxn ang="0">
+                <a:pos x="0" y="1066"/>
+              </a:cxn>
+            </a:cxnLst>
+            <a:rect l="0" t="0" r="0" b="0"/>
+            <a:pathLst>
+              <a:path w="5760" h="1331">
+                <a:moveTo>
+                  <a:pt x="0" y="1066"/>
+                </a:moveTo>
+                <a:lnTo>
+                  <a:pt x="0" y="1331"/>
+                </a:lnTo>
+                <a:lnTo>
+                  <a:pt x="5760" y="1331"/>
+                </a:lnTo>
+                <a:lnTo>
+                  <a:pt x="5760" y="0"/>
+                </a:lnTo>
+                <a:cubicBezTo>
+                  <a:pt x="3220" y="1206"/>
+                  <a:pt x="2250" y="1146"/>
+                  <a:pt x="0" y="1066"/>
+                </a:cubicBezTo>
+                <a:close/>
+              </a:path>
+            </a:pathLst>
+          </a:custGeom>
+          <a:solidFill>
+            <a:schemeClr val="bg1">
+              <a:tint val="80000"/>
+              <a:satMod val="200000"/>
+              <a:alpha val="45000"/>
+            </a:schemeClr>
+          </a:solidFill>
+          <a:ln w="9525" cap="flat" cmpd="sng" algn="ctr">
+            <a:noFill/>
+            <a:prstDash val="solid"/>
+            <a:round/>
+            <a:headEnd type="none" w="med" len="med"/>
+            <a:tailEnd type="none" w="med" len="med"/>
+          </a:ln>
+          <a:effectLst>
+            <a:outerShdw blurRad="50800" dist="44450" dir="16200000" algn="ctr" rotWithShape="0">
+              <a:prstClr val="black">
+                <a:alpha val="35000"/>
+              </a:prstClr>
+            </a:outerShdw>
+          </a:effectLst>
+        </p:spPr>
+        <p:txBody>
+          <a:bodyPr vert="horz" wrap="square" lIns="91440" tIns="45720" rIns="91440" bIns="45720" anchor="t" compatLnSpc="1"/>
+          <a:lstStyle/>
+          <a:p>
+            <a:endParaRPr kumimoji="0" lang="en-US"/>
+          </a:p>
+        </p:txBody>
+      </p:sp>
+      <p:sp>
+        <p:nvSpPr>
+          <p:cNvPr id="9" name="Freeform 8"/>
+          <p:cNvSpPr>
+            <a:spLocks/>
+          </p:cNvSpPr>
+          <p:nvPr/>
+        </p:nvSpPr>
+        <p:spPr bwMode="auto">
+          <a:xfrm>
+            <a:off x="6105525" y="0"/>
+            <a:ext cx="3038475" cy="6858000"/>
+          </a:xfrm>
+          <a:custGeom>
+            <a:avLst/>
+            <a:gdLst>
+              <a:gd name="connsiteX0" fmla="*/ 1914 w 1914"/>
+              <a:gd name="connsiteY0" fmla="*/ 9 h 4329"/>
+              <a:gd name="connsiteX1" fmla="*/ 1914 w 1914"/>
+              <a:gd name="connsiteY1" fmla="*/ 4329 h 4329"/>
+              <a:gd name="connsiteX2" fmla="*/ 204 w 1914"/>
+              <a:gd name="connsiteY2" fmla="*/ 4327 h 4329"/>
+              <a:gd name="connsiteX3" fmla="*/ 0 w 1914"/>
+              <a:gd name="connsiteY3" fmla="*/ 0 h 4329"/>
+              <a:gd name="connsiteX4" fmla="*/ 1914 w 1914"/>
+              <a:gd name="connsiteY4" fmla="*/ 9 h 4329"/>
+            </a:gdLst>
+            <a:ahLst/>
+            <a:cxnLst>
+              <a:cxn ang="0">
+                <a:pos x="connsiteX0" y="connsiteY0"/>
+              </a:cxn>
+              <a:cxn ang="0">
+                <a:pos x="connsiteX1" y="connsiteY1"/>
+              </a:cxn>
+              <a:cxn ang="0">
+                <a:pos x="connsiteX2" y="connsiteY2"/>
+              </a:cxn>
+              <a:cxn ang="0">
+                <a:pos x="connsiteX3" y="connsiteY3"/>
+              </a:cxn>
+              <a:cxn ang="0">
+                <a:pos x="connsiteX4" y="connsiteY4"/>
+              </a:cxn>
+            </a:cxnLst>
+            <a:rect l="l" t="t" r="r" b="b"/>
+            <a:pathLst>
+              <a:path w="1914" h="4329">
+                <a:moveTo>
+                  <a:pt x="1914" y="9"/>
+                </a:moveTo>
+                <a:lnTo>
+                  <a:pt x="1914" y="4329"/>
+                </a:lnTo>
+                <a:lnTo>
+                  <a:pt x="204" y="4327"/>
+                </a:lnTo>
+                <a:cubicBezTo>
+                  <a:pt x="1288" y="3574"/>
+                  <a:pt x="1608" y="1590"/>
+                  <a:pt x="0" y="0"/>
+                </a:cubicBezTo>
+                <a:lnTo>
+                  <a:pt x="1914" y="9"/>
+                </a:lnTo>
+                <a:close/>
+              </a:path>
+            </a:pathLst>
+          </a:custGeom>
+          <a:solidFill>
+            <a:schemeClr val="bg1">
+              <a:tint val="90000"/>
+              <a:satMod val="350000"/>
+              <a:alpha val="40000"/>
+            </a:schemeClr>
+          </a:solidFill>
+          <a:ln w="9525" cap="flat" cmpd="sng" algn="ctr">
+            <a:noFill/>
+            <a:prstDash val="solid"/>
+            <a:round/>
+            <a:headEnd type="none" w="med" len="med"/>
+            <a:tailEnd type="none" w="med" len="med"/>
+          </a:ln>
+          <a:effectLst>
+            <a:outerShdw blurRad="50800" dist="50800" dir="10800000" algn="ctr" rotWithShape="0">
+              <a:prstClr val="black">
+                <a:alpha val="45000"/>
+              </a:prstClr>
+            </a:outerShdw>
+          </a:effectLst>
+        </p:spPr>
+        <p:txBody>
+          <a:bodyPr vert="horz" wrap="square" lIns="91440" tIns="45720" rIns="91440" bIns="45720" anchor="t" compatLnSpc="1"/>
+          <a:lstStyle/>
+          <a:p>
+            <a:endParaRPr kumimoji="0" lang="en-US"/>
+          </a:p>
+        </p:txBody>
+      </p:sp>
+      <p:sp>
+        <p:nvSpPr>
           <p:cNvPr id="2" name="Title 1"/>
           <p:cNvSpPr>
             <a:spLocks noGrp="1"/>
@@ -904,23 +1299,77 @@
         </p:nvSpPr>
         <p:spPr>
           <a:xfrm>
-            <a:off x="722313" y="4406900"/>
-            <a:ext cx="7772400" cy="1362075"/>
+            <a:off x="685800" y="3583837"/>
+            <a:ext cx="6629400" cy="1826363"/>
           </a:xfrm>
         </p:spPr>
         <p:txBody>
-          <a:bodyPr anchor="t"/>
+          <a:bodyPr tIns="0" bIns="0" anchor="t"/>
           <a:lstStyle>
             <a:lvl1pPr algn="l">
-              <a:defRPr sz="4000" b="1" cap="all"/>
+              <a:buNone/>
+              <a:defRPr sz="4200" b="1" cap="none" baseline="0">
+                <a:ln w="5000" cmpd="sng">
+                  <a:solidFill>
+                    <a:schemeClr val="accent1">
+                      <a:tint val="80000"/>
+                      <a:shade val="99000"/>
+                      <a:satMod val="500000"/>
+                    </a:schemeClr>
+                  </a:solidFill>
+                  <a:prstDash val="solid"/>
+                </a:ln>
+                <a:gradFill>
+                  <a:gsLst>
+                    <a:gs pos="0">
+                      <a:schemeClr val="accent1">
+                        <a:tint val="63000"/>
+                        <a:satMod val="255000"/>
+                      </a:schemeClr>
+                    </a:gs>
+                    <a:gs pos="9000">
+                      <a:schemeClr val="accent1">
+                        <a:tint val="63000"/>
+                        <a:satMod val="255000"/>
+                      </a:schemeClr>
+                    </a:gs>
+                    <a:gs pos="53000">
+                      <a:schemeClr val="accent1">
+                        <a:shade val="60000"/>
+                        <a:satMod val="100000"/>
+                      </a:schemeClr>
+                    </a:gs>
+                    <a:gs pos="90000">
+                      <a:schemeClr val="accent1">
+                        <a:tint val="63000"/>
+                        <a:satMod val="255000"/>
+                      </a:schemeClr>
+                    </a:gs>
+                    <a:gs pos="100000">
+                      <a:schemeClr val="accent1">
+                        <a:tint val="63000"/>
+                        <a:satMod val="255000"/>
+                      </a:schemeClr>
+                    </a:gs>
+                  </a:gsLst>
+                  <a:lin ang="5400000"/>
+                </a:gradFill>
+                <a:effectLst>
+                  <a:outerShdw blurRad="50800" dist="38100" dir="5400000" algn="t" rotWithShape="0">
+                    <a:prstClr val="black">
+                      <a:alpha val="50000"/>
+                    </a:prstClr>
+                  </a:outerShdw>
+                </a:effectLst>
+              </a:defRPr>
             </a:lvl1pPr>
           </a:lstStyle>
           <a:p>
             <a:r>
-              <a:rPr lang="en-US" smtClean="0"/>
+              <a:rPr kumimoji="0" lang="en-US" smtClean="0"/>
               <a:t>Click to edit Master title style</a:t>
             </a:r>
-            <a:endParaRPr lang="en-US"/>
+            <a:endParaRPr kumimoji="0" lang="en-US"/>
           </a:p>
         </p:txBody>
       </p:sp>
@@ -936,24 +1385,23 @@
         </p:nvSpPr>
         <p:spPr>
           <a:xfrm>
-            <a:off x="722313" y="2906713"/>
-            <a:ext cx="7772400" cy="1500187"/>
+            <a:off x="685800" y="2485800"/>
+            <a:ext cx="6629400" cy="1066688"/>
           </a:xfrm>
         </p:spPr>
         <p:txBody>
-          <a:bodyPr anchor="b"/>
+          <a:bodyPr lIns="45720" tIns="0" rIns="45720" bIns="0" anchor="b"/>
           <a:lstStyle>
-            <a:lvl1pPr marL="0" indent="0">
+            <a:lvl1pPr marL="0" indent="0" algn="l">
               <a:buNone/>
               <a:defRPr sz="2000">
                 <a:solidFill>
-                  <a:schemeClr val="tx1">
-                    <a:tint val="75000"/>
-                  </a:schemeClr>
+                  <a:schemeClr val="tx1"/>
                 </a:solidFill>
+                <a:effectLst/>
               </a:defRPr>
             </a:lvl1pPr>
-            <a:lvl2pPr marL="457200" indent="0">
+            <a:lvl2pPr>
               <a:buNone/>
               <a:defRPr sz="1800">
                 <a:solidFill>
@@ -963,7 +1411,7 @@
                 </a:solidFill>
               </a:defRPr>
             </a:lvl2pPr>
-            <a:lvl3pPr marL="914400" indent="0">
+            <a:lvl3pPr>
               <a:buNone/>
               <a:defRPr sz="1600">
                 <a:solidFill>
@@ -973,7 +1421,7 @@
                 </a:solidFill>
               </a:defRPr>
             </a:lvl3pPr>
-            <a:lvl4pPr marL="1371600" indent="0">
+            <a:lvl4pPr>
               <a:buNone/>
               <a:defRPr sz="1400">
                 <a:solidFill>
@@ -983,7 +1431,7 @@
                 </a:solidFill>
               </a:defRPr>
             </a:lvl4pPr>
-            <a:lvl5pPr marL="1828800" indent="0">
+            <a:lvl5pPr>
               <a:buNone/>
               <a:defRPr sz="1400">
                 <a:solidFill>
@@ -993,51 +1441,11 @@
                 </a:solidFill>
               </a:defRPr>
             </a:lvl5pPr>
-            <a:lvl6pPr marL="2286000" indent="0">
-              <a:buNone/>
-              <a:defRPr sz="1400">
-                <a:solidFill>
-                  <a:schemeClr val="tx1">
-                    <a:tint val="75000"/>
-                  </a:schemeClr>
-                </a:solidFill>
-              </a:defRPr>
-            </a:lvl6pPr>
-            <a:lvl7pPr marL="2743200" indent="0">
-              <a:buNone/>
-              <a:defRPr sz="1400">
-                <a:solidFill>
-                  <a:schemeClr val="tx1">
-                    <a:tint val="75000"/>
-                  </a:schemeClr>
-                </a:solidFill>
-              </a:defRPr>
-            </a:lvl7pPr>
-            <a:lvl8pPr marL="3200400" indent="0">
-              <a:buNone/>
-              <a:defRPr sz="1400">
-                <a:solidFill>
-                  <a:schemeClr val="tx1">
-                    <a:tint val="75000"/>
-                  </a:schemeClr>
-                </a:solidFill>
-              </a:defRPr>
-            </a:lvl8pPr>
-            <a:lvl9pPr marL="3657600" indent="0">
-              <a:buNone/>
-              <a:defRPr sz="1400">
-                <a:solidFill>
-                  <a:schemeClr val="tx1">
-                    <a:tint val="75000"/>
-                  </a:schemeClr>
-                </a:solidFill>
-              </a:defRPr>
-            </a:lvl9pPr>
           </a:lstStyle>
           <a:p>
-            <a:pPr lvl="0"/>
-            <a:r>
-              <a:rPr lang="en-US" smtClean="0"/>
+            <a:pPr lvl="0" eaLnBrk="1" latinLnBrk="0" hangingPunct="1"/>
+            <a:r>
+              <a:rPr kumimoji="0" lang="en-US" smtClean="0"/>
               <a:t>Click to edit Master text styles</a:t>
             </a:r>
           </a:p>
@@ -1109,14 +1517,9 @@
         </p:txBody>
       </p:sp>
     </p:spTree>
-    <p:extLst>
-      <p:ext uri="{BB962C8B-B14F-4D97-AF65-F5344CB8AC3E}">
-        <p14:creationId xmlns:p14="http://schemas.microsoft.com/office/powerpoint/2010/main" val="383949657"/>
-      </p:ext>
-    </p:extLst>
   </p:cSld>
   <p:clrMapOvr>
-    <a:masterClrMapping/>
+    <a:overrideClrMapping bg1="dk1" tx1="lt1" bg2="dk2" tx2="lt2" accent1="accent1" accent2="accent2" accent3="accent3" accent4="accent4" accent5="accent5" accent6="accent6" hlink="hlink" folHlink="folHlink"/>
   </p:clrMapOvr>
 </p:sldLayout>
 </file>
@@ -1148,16 +1551,21 @@
             <p:ph type="title"/>
           </p:nvPr>
         </p:nvSpPr>
-        <p:spPr/>
-        <p:txBody>
-          <a:bodyPr/>
-          <a:lstStyle/>
-          <a:p>
-            <a:r>
-              <a:rPr lang="en-US" smtClean="0"/>
+        <p:spPr>
+          <a:xfrm>
+            <a:off x="457200" y="274638"/>
+            <a:ext cx="7467600" cy="1143000"/>
+          </a:xfrm>
+        </p:spPr>
+        <p:txBody>
+          <a:bodyPr/>
+          <a:lstStyle/>
+          <a:p>
+            <a:r>
+              <a:rPr kumimoji="0" lang="en-US" smtClean="0"/>
               <a:t>Click to edit Master title style</a:t>
             </a:r>
-            <a:endParaRPr lang="en-US"/>
+            <a:endParaRPr kumimoji="0" lang="en-US"/>
           </a:p>
         </p:txBody>
       </p:sp>
@@ -1174,17 +1582,17 @@
         <p:spPr>
           <a:xfrm>
             <a:off x="457200" y="1600200"/>
-            <a:ext cx="4038600" cy="4525963"/>
+            <a:ext cx="3657600" cy="4525963"/>
           </a:xfrm>
         </p:spPr>
         <p:txBody>
           <a:bodyPr/>
           <a:lstStyle>
             <a:lvl1pPr>
-              <a:defRPr sz="2800"/>
+              <a:defRPr sz="2600"/>
             </a:lvl1pPr>
             <a:lvl2pPr>
-              <a:defRPr sz="2400"/>
+              <a:defRPr sz="2200"/>
             </a:lvl2pPr>
             <a:lvl3pPr>
               <a:defRPr sz="2000"/>
@@ -1195,54 +1603,42 @@
             <a:lvl5pPr>
               <a:defRPr sz="1800"/>
             </a:lvl5pPr>
-            <a:lvl6pPr>
-              <a:defRPr sz="1800"/>
-            </a:lvl6pPr>
-            <a:lvl7pPr>
-              <a:defRPr sz="1800"/>
-            </a:lvl7pPr>
-            <a:lvl8pPr>
-              <a:defRPr sz="1800"/>
-            </a:lvl8pPr>
-            <a:lvl9pPr>
-              <a:defRPr sz="1800"/>
-            </a:lvl9pPr>
           </a:lstStyle>
           <a:p>
-            <a:pPr lvl="0"/>
+            <a:pPr lvl="0" eaLnBrk="1" latinLnBrk="0" hangingPunct="1"/>
             <a:r>
               <a:rPr lang="en-US" smtClean="0"/>
               <a:t>Click to edit Master text styles</a:t>
             </a:r>
           </a:p>
           <a:p>
-            <a:pPr lvl="1"/>
+            <a:pPr lvl="1" eaLnBrk="1" latinLnBrk="0" hangingPunct="1"/>
             <a:r>
               <a:rPr lang="en-US" smtClean="0"/>
               <a:t>Second level</a:t>
             </a:r>
           </a:p>
           <a:p>
-            <a:pPr lvl="2"/>
+            <a:pPr lvl="2" eaLnBrk="1" latinLnBrk="0" hangingPunct="1"/>
             <a:r>
               <a:rPr lang="en-US" smtClean="0"/>
               <a:t>Third level</a:t>
             </a:r>
           </a:p>
           <a:p>
-            <a:pPr lvl="3"/>
+            <a:pPr lvl="3" eaLnBrk="1" latinLnBrk="0" hangingPunct="1"/>
             <a:r>
               <a:rPr lang="en-US" smtClean="0"/>
               <a:t>Fourth level</a:t>
             </a:r>
           </a:p>
           <a:p>
-            <a:pPr lvl="4"/>
+            <a:pPr lvl="4" eaLnBrk="1" latinLnBrk="0" hangingPunct="1"/>
             <a:r>
               <a:rPr lang="en-US" smtClean="0"/>
               <a:t>Fifth level</a:t>
             </a:r>
-            <a:endParaRPr lang="en-US"/>
+            <a:endParaRPr kumimoji="0" lang="en-US"/>
           </a:p>
         </p:txBody>
       </p:sp>
@@ -1258,18 +1654,18 @@
         </p:nvSpPr>
         <p:spPr>
           <a:xfrm>
-            <a:off x="4648200" y="1600200"/>
-            <a:ext cx="4038600" cy="4525963"/>
+            <a:off x="4267200" y="1600200"/>
+            <a:ext cx="3657600" cy="4525963"/>
           </a:xfrm>
         </p:spPr>
         <p:txBody>
           <a:bodyPr/>
           <a:lstStyle>
             <a:lvl1pPr>
-              <a:defRPr sz="2800"/>
+              <a:defRPr sz="2600"/>
             </a:lvl1pPr>
             <a:lvl2pPr>
-              <a:defRPr sz="2400"/>
+              <a:defRPr sz="2200"/>
             </a:lvl2pPr>
             <a:lvl3pPr>
               <a:defRPr sz="2000"/>
@@ -1280,54 +1676,42 @@
             <a:lvl5pPr>
               <a:defRPr sz="1800"/>
             </a:lvl5pPr>
-            <a:lvl6pPr>
-              <a:defRPr sz="1800"/>
-            </a:lvl6pPr>
-            <a:lvl7pPr>
-              <a:defRPr sz="1800"/>
-            </a:lvl7pPr>
-            <a:lvl8pPr>
-              <a:defRPr sz="1800"/>
-            </a:lvl8pPr>
-            <a:lvl9pPr>
-              <a:defRPr sz="1800"/>
-            </a:lvl9pPr>
           </a:lstStyle>
           <a:p>
-            <a:pPr lvl="0"/>
+            <a:pPr lvl="0" eaLnBrk="1" latinLnBrk="0" hangingPunct="1"/>
             <a:r>
               <a:rPr lang="en-US" smtClean="0"/>
               <a:t>Click to edit Master text styles</a:t>
             </a:r>
           </a:p>
           <a:p>
-            <a:pPr lvl="1"/>
+            <a:pPr lvl="1" eaLnBrk="1" latinLnBrk="0" hangingPunct="1"/>
             <a:r>
               <a:rPr lang="en-US" smtClean="0"/>
               <a:t>Second level</a:t>
             </a:r>
           </a:p>
           <a:p>
-            <a:pPr lvl="2"/>
+            <a:pPr lvl="2" eaLnBrk="1" latinLnBrk="0" hangingPunct="1"/>
             <a:r>
               <a:rPr lang="en-US" smtClean="0"/>
               <a:t>Third level</a:t>
             </a:r>
           </a:p>
           <a:p>
-            <a:pPr lvl="3"/>
+            <a:pPr lvl="3" eaLnBrk="1" latinLnBrk="0" hangingPunct="1"/>
             <a:r>
               <a:rPr lang="en-US" smtClean="0"/>
               <a:t>Fourth level</a:t>
             </a:r>
           </a:p>
           <a:p>
-            <a:pPr lvl="4"/>
+            <a:pPr lvl="4" eaLnBrk="1" latinLnBrk="0" hangingPunct="1"/>
             <a:r>
               <a:rPr lang="en-US" smtClean="0"/>
               <a:t>Fifth level</a:t>
             </a:r>
-            <a:endParaRPr lang="en-US"/>
+            <a:endParaRPr kumimoji="0" lang="en-US"/>
           </a:p>
         </p:txBody>
       </p:sp>
@@ -1397,11 +1781,6 @@
         </p:txBody>
       </p:sp>
     </p:spTree>
-    <p:extLst>
-      <p:ext uri="{BB962C8B-B14F-4D97-AF65-F5344CB8AC3E}">
-        <p14:creationId xmlns:p14="http://schemas.microsoft.com/office/powerpoint/2010/main" val="422032606"/>
-      </p:ext>
-    </p:extLst>
   </p:cSld>
   <p:clrMapOvr>
     <a:masterClrMapping/>
@@ -1410,7 +1789,7 @@
 </file>
 
 <file path=ppt/slideLayouts/slideLayout5.xml><?xml version="1.0" encoding="utf-8"?>
-<p:sldLayout xmlns:a="http://schemas.openxmlformats.org/drawingml/2006/main" xmlns:r="http://schemas.openxmlformats.org/officeDocument/2006/relationships" xmlns:p="http://schemas.openxmlformats.org/presentationml/2006/main" type="twoTxTwoObj" preserve="1">
+<p:sldLayout xmlns:a="http://schemas.openxmlformats.org/drawingml/2006/main" xmlns:r="http://schemas.openxmlformats.org/officeDocument/2006/relationships" xmlns:p="http://schemas.openxmlformats.org/presentationml/2006/main" showMasterSp="0" type="twoTxTwoObj" preserve="1">
   <p:cSld name="Comparison">
     <p:spTree>
       <p:nvGrpSpPr>
@@ -1436,9 +1815,14 @@
             <p:ph type="title"/>
           </p:nvPr>
         </p:nvSpPr>
-        <p:spPr/>
-        <p:txBody>
-          <a:bodyPr/>
+        <p:spPr>
+          <a:xfrm>
+            <a:off x="457200" y="273050"/>
+            <a:ext cx="8229600" cy="1143000"/>
+          </a:xfrm>
+        </p:spPr>
+        <p:txBody>
+          <a:bodyPr anchor="ctr"/>
           <a:lstStyle>
             <a:lvl1pPr>
               <a:defRPr/>
@@ -1446,10 +1830,10 @@
           </a:lstStyle>
           <a:p>
             <a:r>
-              <a:rPr lang="en-US" smtClean="0"/>
+              <a:rPr kumimoji="0" lang="en-US" smtClean="0"/>
               <a:t>Click to edit Master title style</a:t>
             </a:r>
-            <a:endParaRPr lang="en-US"/>
+            <a:endParaRPr kumimoji="0" lang="en-US"/>
           </a:p>
         </p:txBody>
       </p:sp>
@@ -1465,54 +1849,95 @@
         </p:nvSpPr>
         <p:spPr>
           <a:xfrm>
-            <a:off x="457200" y="1535113"/>
-            <a:ext cx="4040188" cy="639762"/>
+            <a:off x="457200" y="5486400"/>
+            <a:ext cx="4040188" cy="838200"/>
           </a:xfrm>
         </p:spPr>
         <p:txBody>
-          <a:bodyPr anchor="b"/>
+          <a:bodyPr anchor="t"/>
           <a:lstStyle>
             <a:lvl1pPr marL="0" indent="0">
               <a:buNone/>
-              <a:defRPr sz="2400" b="1"/>
+              <a:defRPr sz="2400" b="1">
+                <a:solidFill>
+                  <a:schemeClr val="accent1"/>
+                </a:solidFill>
+              </a:defRPr>
             </a:lvl1pPr>
-            <a:lvl2pPr marL="457200" indent="0">
+            <a:lvl2pPr>
               <a:buNone/>
               <a:defRPr sz="2000" b="1"/>
             </a:lvl2pPr>
-            <a:lvl3pPr marL="914400" indent="0">
+            <a:lvl3pPr>
               <a:buNone/>
               <a:defRPr sz="1800" b="1"/>
             </a:lvl3pPr>
-            <a:lvl4pPr marL="1371600" indent="0">
+            <a:lvl4pPr>
               <a:buNone/>
               <a:defRPr sz="1600" b="1"/>
             </a:lvl4pPr>
-            <a:lvl5pPr marL="1828800" indent="0">
+            <a:lvl5pPr>
               <a:buNone/>
               <a:defRPr sz="1600" b="1"/>
             </a:lvl5pPr>
-            <a:lvl6pPr marL="2286000" indent="0">
+          </a:lstStyle>
+          <a:p>
+            <a:pPr lvl="0" eaLnBrk="1" latinLnBrk="0" hangingPunct="1"/>
+            <a:r>
+              <a:rPr kumimoji="0" lang="en-US" smtClean="0"/>
+              <a:t>Click to edit Master text styles</a:t>
+            </a:r>
+          </a:p>
+        </p:txBody>
+      </p:sp>
+      <p:sp>
+        <p:nvSpPr>
+          <p:cNvPr id="4" name="Text Placeholder 3"/>
+          <p:cNvSpPr>
+            <a:spLocks noGrp="1"/>
+          </p:cNvSpPr>
+          <p:nvPr>
+            <p:ph type="body" sz="half" idx="3"/>
+          </p:nvPr>
+        </p:nvSpPr>
+        <p:spPr>
+          <a:xfrm>
+            <a:off x="4645025" y="5486400"/>
+            <a:ext cx="4041775" cy="838200"/>
+          </a:xfrm>
+        </p:spPr>
+        <p:txBody>
+          <a:bodyPr anchor="t"/>
+          <a:lstStyle>
+            <a:lvl1pPr marL="0" indent="0">
+              <a:buNone/>
+              <a:defRPr sz="2400" b="1">
+                <a:solidFill>
+                  <a:schemeClr val="accent1"/>
+                </a:solidFill>
+              </a:defRPr>
+            </a:lvl1pPr>
+            <a:lvl2pPr>
+              <a:buNone/>
+              <a:defRPr sz="2000" b="1"/>
+            </a:lvl2pPr>
+            <a:lvl3pPr>
+              <a:buNone/>
+              <a:defRPr sz="1800" b="1"/>
+            </a:lvl3pPr>
+            <a:lvl4pPr>
               <a:buNone/>
               <a:defRPr sz="1600" b="1"/>
-            </a:lvl6pPr>
-            <a:lvl7pPr marL="2743200" indent="0">
+            </a:lvl4pPr>
+            <a:lvl5pPr>
               <a:buNone/>
               <a:defRPr sz="1600" b="1"/>
-            </a:lvl7pPr>
-            <a:lvl8pPr marL="3200400" indent="0">
-              <a:buNone/>
-              <a:defRPr sz="1600" b="1"/>
-            </a:lvl8pPr>
-            <a:lvl9pPr marL="3657600" indent="0">
-              <a:buNone/>
-              <a:defRPr sz="1600" b="1"/>
-            </a:lvl9pPr>
+            </a:lvl5pPr>
           </a:lstStyle>
           <a:p>
-            <a:pPr lvl="0"/>
-            <a:r>
-              <a:rPr lang="en-US" smtClean="0"/>
+            <a:pPr lvl="0" eaLnBrk="1" latinLnBrk="0" hangingPunct="1"/>
+            <a:r>
+              <a:rPr kumimoji="0" lang="en-US" smtClean="0"/>
               <a:t>Click to edit Master text styles</a:t>
             </a:r>
           </a:p>
@@ -1520,18 +1945,18 @@
       </p:sp>
       <p:sp>
         <p:nvSpPr>
-          <p:cNvPr id="4" name="Content Placeholder 3"/>
-          <p:cNvSpPr>
-            <a:spLocks noGrp="1"/>
-          </p:cNvSpPr>
-          <p:nvPr>
-            <p:ph sz="half" idx="2"/>
+          <p:cNvPr id="5" name="Content Placeholder 4"/>
+          <p:cNvSpPr>
+            <a:spLocks noGrp="1"/>
+          </p:cNvSpPr>
+          <p:nvPr>
+            <p:ph sz="quarter" idx="2"/>
           </p:nvPr>
         </p:nvSpPr>
         <p:spPr>
           <a:xfrm>
-            <a:off x="457200" y="2174875"/>
-            <a:ext cx="4040188" cy="3951288"/>
+            <a:off x="457200" y="1516912"/>
+            <a:ext cx="4040188" cy="3941763"/>
           </a:xfrm>
         </p:spPr>
         <p:txBody>
@@ -1552,136 +1977,59 @@
             <a:lvl5pPr>
               <a:defRPr sz="1600"/>
             </a:lvl5pPr>
-            <a:lvl6pPr>
-              <a:defRPr sz="1600"/>
-            </a:lvl6pPr>
-            <a:lvl7pPr>
-              <a:defRPr sz="1600"/>
-            </a:lvl7pPr>
-            <a:lvl8pPr>
-              <a:defRPr sz="1600"/>
-            </a:lvl8pPr>
-            <a:lvl9pPr>
-              <a:defRPr sz="1600"/>
-            </a:lvl9pPr>
           </a:lstStyle>
           <a:p>
-            <a:pPr lvl="0"/>
+            <a:pPr lvl="0" eaLnBrk="1" latinLnBrk="0" hangingPunct="1"/>
             <a:r>
               <a:rPr lang="en-US" smtClean="0"/>
               <a:t>Click to edit Master text styles</a:t>
             </a:r>
           </a:p>
           <a:p>
-            <a:pPr lvl="1"/>
+            <a:pPr lvl="1" eaLnBrk="1" latinLnBrk="0" hangingPunct="1"/>
             <a:r>
               <a:rPr lang="en-US" smtClean="0"/>
               <a:t>Second level</a:t>
             </a:r>
           </a:p>
           <a:p>
-            <a:pPr lvl="2"/>
+            <a:pPr lvl="2" eaLnBrk="1" latinLnBrk="0" hangingPunct="1"/>
             <a:r>
               <a:rPr lang="en-US" smtClean="0"/>
               <a:t>Third level</a:t>
             </a:r>
           </a:p>
           <a:p>
-            <a:pPr lvl="3"/>
+            <a:pPr lvl="3" eaLnBrk="1" latinLnBrk="0" hangingPunct="1"/>
             <a:r>
               <a:rPr lang="en-US" smtClean="0"/>
               <a:t>Fourth level</a:t>
             </a:r>
           </a:p>
           <a:p>
-            <a:pPr lvl="4"/>
+            <a:pPr lvl="4" eaLnBrk="1" latinLnBrk="0" hangingPunct="1"/>
             <a:r>
               <a:rPr lang="en-US" smtClean="0"/>
               <a:t>Fifth level</a:t>
             </a:r>
-            <a:endParaRPr lang="en-US"/>
-          </a:p>
-        </p:txBody>
-      </p:sp>
-      <p:sp>
-        <p:nvSpPr>
-          <p:cNvPr id="5" name="Text Placeholder 4"/>
-          <p:cNvSpPr>
-            <a:spLocks noGrp="1"/>
-          </p:cNvSpPr>
-          <p:nvPr>
-            <p:ph type="body" sz="quarter" idx="3"/>
+            <a:endParaRPr kumimoji="0" lang="en-US"/>
+          </a:p>
+        </p:txBody>
+      </p:sp>
+      <p:sp>
+        <p:nvSpPr>
+          <p:cNvPr id="6" name="Content Placeholder 5"/>
+          <p:cNvSpPr>
+            <a:spLocks noGrp="1"/>
+          </p:cNvSpPr>
+          <p:nvPr>
+            <p:ph sz="quarter" idx="4"/>
           </p:nvPr>
         </p:nvSpPr>
         <p:spPr>
           <a:xfrm>
-            <a:off x="4645025" y="1535113"/>
-            <a:ext cx="4041775" cy="639762"/>
-          </a:xfrm>
-        </p:spPr>
-        <p:txBody>
-          <a:bodyPr anchor="b"/>
-          <a:lstStyle>
-            <a:lvl1pPr marL="0" indent="0">
-              <a:buNone/>
-              <a:defRPr sz="2400" b="1"/>
-            </a:lvl1pPr>
-            <a:lvl2pPr marL="457200" indent="0">
-              <a:buNone/>
-              <a:defRPr sz="2000" b="1"/>
-            </a:lvl2pPr>
-            <a:lvl3pPr marL="914400" indent="0">
-              <a:buNone/>
-              <a:defRPr sz="1800" b="1"/>
-            </a:lvl3pPr>
-            <a:lvl4pPr marL="1371600" indent="0">
-              <a:buNone/>
-              <a:defRPr sz="1600" b="1"/>
-            </a:lvl4pPr>
-            <a:lvl5pPr marL="1828800" indent="0">
-              <a:buNone/>
-              <a:defRPr sz="1600" b="1"/>
-            </a:lvl5pPr>
-            <a:lvl6pPr marL="2286000" indent="0">
-              <a:buNone/>
-              <a:defRPr sz="1600" b="1"/>
-            </a:lvl6pPr>
-            <a:lvl7pPr marL="2743200" indent="0">
-              <a:buNone/>
-              <a:defRPr sz="1600" b="1"/>
-            </a:lvl7pPr>
-            <a:lvl8pPr marL="3200400" indent="0">
-              <a:buNone/>
-              <a:defRPr sz="1600" b="1"/>
-            </a:lvl8pPr>
-            <a:lvl9pPr marL="3657600" indent="0">
-              <a:buNone/>
-              <a:defRPr sz="1600" b="1"/>
-            </a:lvl9pPr>
-          </a:lstStyle>
-          <a:p>
-            <a:pPr lvl="0"/>
-            <a:r>
-              <a:rPr lang="en-US" smtClean="0"/>
-              <a:t>Click to edit Master text styles</a:t>
-            </a:r>
-          </a:p>
-        </p:txBody>
-      </p:sp>
-      <p:sp>
-        <p:nvSpPr>
-          <p:cNvPr id="6" name="Content Placeholder 5"/>
-          <p:cNvSpPr>
-            <a:spLocks noGrp="1"/>
-          </p:cNvSpPr>
-          <p:nvPr>
-            <p:ph sz="quarter" idx="4"/>
-          </p:nvPr>
-        </p:nvSpPr>
-        <p:spPr>
-          <a:xfrm>
-            <a:off x="4645025" y="2174875"/>
-            <a:ext cx="4041775" cy="3951288"/>
+            <a:off x="4645025" y="1516912"/>
+            <a:ext cx="4041775" cy="3941763"/>
           </a:xfrm>
         </p:spPr>
         <p:txBody>
@@ -1702,54 +2050,42 @@
             <a:lvl5pPr>
               <a:defRPr sz="1600"/>
             </a:lvl5pPr>
-            <a:lvl6pPr>
-              <a:defRPr sz="1600"/>
-            </a:lvl6pPr>
-            <a:lvl7pPr>
-              <a:defRPr sz="1600"/>
-            </a:lvl7pPr>
-            <a:lvl8pPr>
-              <a:defRPr sz="1600"/>
-            </a:lvl8pPr>
-            <a:lvl9pPr>
-              <a:defRPr sz="1600"/>
-            </a:lvl9pPr>
           </a:lstStyle>
           <a:p>
-            <a:pPr lvl="0"/>
+            <a:pPr lvl="0" eaLnBrk="1" latinLnBrk="0" hangingPunct="1"/>
             <a:r>
               <a:rPr lang="en-US" smtClean="0"/>
               <a:t>Click to edit Master text styles</a:t>
             </a:r>
           </a:p>
           <a:p>
-            <a:pPr lvl="1"/>
+            <a:pPr lvl="1" eaLnBrk="1" latinLnBrk="0" hangingPunct="1"/>
             <a:r>
               <a:rPr lang="en-US" smtClean="0"/>
               <a:t>Second level</a:t>
             </a:r>
           </a:p>
           <a:p>
-            <a:pPr lvl="2"/>
+            <a:pPr lvl="2" eaLnBrk="1" latinLnBrk="0" hangingPunct="1"/>
             <a:r>
               <a:rPr lang="en-US" smtClean="0"/>
               <a:t>Third level</a:t>
             </a:r>
           </a:p>
           <a:p>
-            <a:pPr lvl="3"/>
+            <a:pPr lvl="3" eaLnBrk="1" latinLnBrk="0" hangingPunct="1"/>
             <a:r>
               <a:rPr lang="en-US" smtClean="0"/>
               <a:t>Fourth level</a:t>
             </a:r>
           </a:p>
           <a:p>
-            <a:pPr lvl="4"/>
+            <a:pPr lvl="4" eaLnBrk="1" latinLnBrk="0" hangingPunct="1"/>
             <a:r>
               <a:rPr lang="en-US" smtClean="0"/>
               <a:t>Fifth level</a:t>
             </a:r>
-            <a:endParaRPr lang="en-US"/>
+            <a:endParaRPr kumimoji="0" lang="en-US"/>
           </a:p>
         </p:txBody>
       </p:sp>
@@ -1819,11 +2155,6 @@
         </p:txBody>
       </p:sp>
     </p:spTree>
-    <p:extLst>
-      <p:ext uri="{BB962C8B-B14F-4D97-AF65-F5344CB8AC3E}">
-        <p14:creationId xmlns:p14="http://schemas.microsoft.com/office/powerpoint/2010/main" val="1977837412"/>
-      </p:ext>
-    </p:extLst>
   </p:cSld>
   <p:clrMapOvr>
     <a:masterClrMapping/>
@@ -1858,22 +2189,31 @@
             <p:ph type="title"/>
           </p:nvPr>
         </p:nvSpPr>
-        <p:spPr/>
-        <p:txBody>
-          <a:bodyPr/>
-          <a:lstStyle/>
-          <a:p>
-            <a:r>
-              <a:rPr lang="en-US" smtClean="0"/>
+        <p:spPr>
+          <a:xfrm>
+            <a:off x="457200" y="274320"/>
+            <a:ext cx="7470648" cy="1143000"/>
+          </a:xfrm>
+        </p:spPr>
+        <p:txBody>
+          <a:bodyPr anchor="ctr"/>
+          <a:lstStyle>
+            <a:lvl1pPr algn="l">
+              <a:defRPr sz="4600"/>
+            </a:lvl1pPr>
+          </a:lstStyle>
+          <a:p>
+            <a:r>
+              <a:rPr kumimoji="0" lang="en-US" smtClean="0"/>
               <a:t>Click to edit Master title style</a:t>
             </a:r>
-            <a:endParaRPr lang="en-US"/>
-          </a:p>
-        </p:txBody>
-      </p:sp>
-      <p:sp>
-        <p:nvSpPr>
-          <p:cNvPr id="3" name="Date Placeholder 2"/>
+            <a:endParaRPr kumimoji="0" lang="en-US"/>
+          </a:p>
+        </p:txBody>
+      </p:sp>
+      <p:sp>
+        <p:nvSpPr>
+          <p:cNvPr id="7" name="Date Placeholder 6"/>
           <p:cNvSpPr>
             <a:spLocks noGrp="1"/>
           </p:cNvSpPr>
@@ -1896,31 +2236,12 @@
       </p:sp>
       <p:sp>
         <p:nvSpPr>
-          <p:cNvPr id="4" name="Footer Placeholder 3"/>
-          <p:cNvSpPr>
-            <a:spLocks noGrp="1"/>
-          </p:cNvSpPr>
-          <p:nvPr>
-            <p:ph type="ftr" sz="quarter" idx="11"/>
-          </p:nvPr>
-        </p:nvSpPr>
-        <p:spPr/>
-        <p:txBody>
-          <a:bodyPr/>
-          <a:lstStyle/>
-          <a:p>
-            <a:endParaRPr lang="en-US"/>
-          </a:p>
-        </p:txBody>
-      </p:sp>
-      <p:sp>
-        <p:nvSpPr>
-          <p:cNvPr id="5" name="Slide Number Placeholder 4"/>
-          <p:cNvSpPr>
-            <a:spLocks noGrp="1"/>
-          </p:cNvSpPr>
-          <p:nvPr>
-            <p:ph type="sldNum" sz="quarter" idx="12"/>
+          <p:cNvPr id="8" name="Slide Number Placeholder 7"/>
+          <p:cNvSpPr>
+            <a:spLocks noGrp="1"/>
+          </p:cNvSpPr>
+          <p:nvPr>
+            <p:ph type="sldNum" sz="quarter" idx="11"/>
           </p:nvPr>
         </p:nvSpPr>
         <p:spPr/>
@@ -1936,12 +2257,26 @@
           </a:p>
         </p:txBody>
       </p:sp>
+      <p:sp>
+        <p:nvSpPr>
+          <p:cNvPr id="9" name="Footer Placeholder 8"/>
+          <p:cNvSpPr>
+            <a:spLocks noGrp="1"/>
+          </p:cNvSpPr>
+          <p:nvPr>
+            <p:ph type="ftr" sz="quarter" idx="12"/>
+          </p:nvPr>
+        </p:nvSpPr>
+        <p:spPr/>
+        <p:txBody>
+          <a:bodyPr/>
+          <a:lstStyle/>
+          <a:p>
+            <a:endParaRPr lang="en-US"/>
+          </a:p>
+        </p:txBody>
+      </p:sp>
     </p:spTree>
-    <p:extLst>
-      <p:ext uri="{BB962C8B-B14F-4D97-AF65-F5344CB8AC3E}">
-        <p14:creationId xmlns:p14="http://schemas.microsoft.com/office/powerpoint/2010/main" val="833743753"/>
-      </p:ext>
-    </p:extLst>
   </p:cSld>
   <p:clrMapOvr>
     <a:masterClrMapping/>
@@ -2032,11 +2367,6 @@
         </p:txBody>
       </p:sp>
     </p:spTree>
-    <p:extLst>
-      <p:ext uri="{BB962C8B-B14F-4D97-AF65-F5344CB8AC3E}">
-        <p14:creationId xmlns:p14="http://schemas.microsoft.com/office/powerpoint/2010/main" val="3332490983"/>
-      </p:ext>
-    </p:extLst>
   </p:cSld>
   <p:clrMapOvr>
     <a:masterClrMapping/>
@@ -2073,53 +2403,107 @@
         </p:nvSpPr>
         <p:spPr>
           <a:xfrm>
-            <a:off x="457200" y="273050"/>
-            <a:ext cx="3008313" cy="1162050"/>
+            <a:off x="457200" y="1185528"/>
+            <a:ext cx="3200400" cy="730250"/>
           </a:xfrm>
         </p:spPr>
         <p:txBody>
-          <a:bodyPr anchor="b"/>
+          <a:bodyPr tIns="0" bIns="0" anchor="t"/>
           <a:lstStyle>
             <a:lvl1pPr algn="l">
-              <a:defRPr sz="2000" b="1"/>
+              <a:buNone/>
+              <a:defRPr sz="1800" b="1">
+                <a:solidFill>
+                  <a:schemeClr val="accent1"/>
+                </a:solidFill>
+              </a:defRPr>
             </a:lvl1pPr>
           </a:lstStyle>
           <a:p>
             <a:r>
-              <a:rPr lang="en-US" smtClean="0"/>
+              <a:rPr kumimoji="0" lang="en-US" smtClean="0"/>
               <a:t>Click to edit Master title style</a:t>
             </a:r>
-            <a:endParaRPr lang="en-US"/>
-          </a:p>
-        </p:txBody>
-      </p:sp>
-      <p:sp>
-        <p:nvSpPr>
-          <p:cNvPr id="3" name="Content Placeholder 2"/>
-          <p:cNvSpPr>
-            <a:spLocks noGrp="1"/>
-          </p:cNvSpPr>
-          <p:nvPr>
-            <p:ph idx="1"/>
+            <a:endParaRPr kumimoji="0" lang="en-US"/>
+          </a:p>
+        </p:txBody>
+      </p:sp>
+      <p:sp>
+        <p:nvSpPr>
+          <p:cNvPr id="3" name="Text Placeholder 2"/>
+          <p:cNvSpPr>
+            <a:spLocks noGrp="1"/>
+          </p:cNvSpPr>
+          <p:nvPr>
+            <p:ph type="body" idx="2"/>
           </p:nvPr>
         </p:nvSpPr>
         <p:spPr>
           <a:xfrm>
-            <a:off x="3575050" y="273050"/>
-            <a:ext cx="5111750" cy="5853113"/>
+            <a:off x="457200" y="214424"/>
+            <a:ext cx="2743200" cy="914400"/>
           </a:xfrm>
         </p:spPr>
         <p:txBody>
+          <a:bodyPr lIns="45720" tIns="0" rIns="45720" bIns="0" anchor="b"/>
+          <a:lstStyle>
+            <a:lvl1pPr marL="0" indent="0" algn="l">
+              <a:buNone/>
+              <a:defRPr sz="1400"/>
+            </a:lvl1pPr>
+            <a:lvl2pPr>
+              <a:buNone/>
+              <a:defRPr sz="1200"/>
+            </a:lvl2pPr>
+            <a:lvl3pPr>
+              <a:buNone/>
+              <a:defRPr sz="1000"/>
+            </a:lvl3pPr>
+            <a:lvl4pPr>
+              <a:buNone/>
+              <a:defRPr sz="900"/>
+            </a:lvl4pPr>
+            <a:lvl5pPr>
+              <a:buNone/>
+              <a:defRPr sz="900"/>
+            </a:lvl5pPr>
+          </a:lstStyle>
+          <a:p>
+            <a:pPr lvl="0" eaLnBrk="1" latinLnBrk="0" hangingPunct="1"/>
+            <a:r>
+              <a:rPr kumimoji="0" lang="en-US" smtClean="0"/>
+              <a:t>Click to edit Master text styles</a:t>
+            </a:r>
+          </a:p>
+        </p:txBody>
+      </p:sp>
+      <p:sp>
+        <p:nvSpPr>
+          <p:cNvPr id="4" name="Content Placeholder 3"/>
+          <p:cNvSpPr>
+            <a:spLocks noGrp="1"/>
+          </p:cNvSpPr>
+          <p:nvPr>
+            <p:ph sz="half" idx="1"/>
+          </p:nvPr>
+        </p:nvSpPr>
+        <p:spPr>
+          <a:xfrm>
+            <a:off x="457200" y="1981200"/>
+            <a:ext cx="7086600" cy="3810000"/>
+          </a:xfrm>
+        </p:spPr>
+        <p:txBody>
           <a:bodyPr/>
           <a:lstStyle>
             <a:lvl1pPr>
-              <a:defRPr sz="3200"/>
+              <a:defRPr sz="2800"/>
             </a:lvl1pPr>
             <a:lvl2pPr>
-              <a:defRPr sz="2800"/>
+              <a:defRPr sz="2400"/>
             </a:lvl2pPr>
             <a:lvl3pPr>
-              <a:defRPr sz="2400"/>
+              <a:defRPr sz="2200"/>
             </a:lvl3pPr>
             <a:lvl4pPr>
               <a:defRPr sz="2000"/>
@@ -2127,119 +2511,42 @@
             <a:lvl5pPr>
               <a:defRPr sz="2000"/>
             </a:lvl5pPr>
-            <a:lvl6pPr>
-              <a:defRPr sz="2000"/>
-            </a:lvl6pPr>
-            <a:lvl7pPr>
-              <a:defRPr sz="2000"/>
-            </a:lvl7pPr>
-            <a:lvl8pPr>
-              <a:defRPr sz="2000"/>
-            </a:lvl8pPr>
-            <a:lvl9pPr>
-              <a:defRPr sz="2000"/>
-            </a:lvl9pPr>
           </a:lstStyle>
           <a:p>
-            <a:pPr lvl="0"/>
+            <a:pPr lvl="0" eaLnBrk="1" latinLnBrk="0" hangingPunct="1"/>
             <a:r>
               <a:rPr lang="en-US" smtClean="0"/>
               <a:t>Click to edit Master text styles</a:t>
             </a:r>
           </a:p>
           <a:p>
-            <a:pPr lvl="1"/>
+            <a:pPr lvl="1" eaLnBrk="1" latinLnBrk="0" hangingPunct="1"/>
             <a:r>
               <a:rPr lang="en-US" smtClean="0"/>
               <a:t>Second level</a:t>
             </a:r>
           </a:p>
           <a:p>
-            <a:pPr lvl="2"/>
+            <a:pPr lvl="2" eaLnBrk="1" latinLnBrk="0" hangingPunct="1"/>
             <a:r>
               <a:rPr lang="en-US" smtClean="0"/>
               <a:t>Third level</a:t>
             </a:r>
           </a:p>
           <a:p>
-            <a:pPr lvl="3"/>
+            <a:pPr lvl="3" eaLnBrk="1" latinLnBrk="0" hangingPunct="1"/>
             <a:r>
               <a:rPr lang="en-US" smtClean="0"/>
               <a:t>Fourth level</a:t>
             </a:r>
           </a:p>
           <a:p>
-            <a:pPr lvl="4"/>
+            <a:pPr lvl="4" eaLnBrk="1" latinLnBrk="0" hangingPunct="1"/>
             <a:r>
               <a:rPr lang="en-US" smtClean="0"/>
               <a:t>Fifth level</a:t>
             </a:r>
-            <a:endParaRPr lang="en-US"/>
-          </a:p>
-        </p:txBody>
-      </p:sp>
-      <p:sp>
-        <p:nvSpPr>
-          <p:cNvPr id="4" name="Text Placeholder 3"/>
-          <p:cNvSpPr>
-            <a:spLocks noGrp="1"/>
-          </p:cNvSpPr>
-          <p:nvPr>
-            <p:ph type="body" sz="half" idx="2"/>
-          </p:nvPr>
-        </p:nvSpPr>
-        <p:spPr>
-          <a:xfrm>
-            <a:off x="457200" y="1435100"/>
-            <a:ext cx="3008313" cy="4691063"/>
-          </a:xfrm>
-        </p:spPr>
-        <p:txBody>
-          <a:bodyPr/>
-          <a:lstStyle>
-            <a:lvl1pPr marL="0" indent="0">
-              <a:buNone/>
-              <a:defRPr sz="1400"/>
-            </a:lvl1pPr>
-            <a:lvl2pPr marL="457200" indent="0">
-              <a:buNone/>
-              <a:defRPr sz="1200"/>
-            </a:lvl2pPr>
-            <a:lvl3pPr marL="914400" indent="0">
-              <a:buNone/>
-              <a:defRPr sz="1000"/>
-            </a:lvl3pPr>
-            <a:lvl4pPr marL="1371600" indent="0">
-              <a:buNone/>
-              <a:defRPr sz="900"/>
-            </a:lvl4pPr>
-            <a:lvl5pPr marL="1828800" indent="0">
-              <a:buNone/>
-              <a:defRPr sz="900"/>
-            </a:lvl5pPr>
-            <a:lvl6pPr marL="2286000" indent="0">
-              <a:buNone/>
-              <a:defRPr sz="900"/>
-            </a:lvl6pPr>
-            <a:lvl7pPr marL="2743200" indent="0">
-              <a:buNone/>
-              <a:defRPr sz="900"/>
-            </a:lvl7pPr>
-            <a:lvl8pPr marL="3200400" indent="0">
-              <a:buNone/>
-              <a:defRPr sz="900"/>
-            </a:lvl8pPr>
-            <a:lvl9pPr marL="3657600" indent="0">
-              <a:buNone/>
-              <a:defRPr sz="900"/>
-            </a:lvl9pPr>
-          </a:lstStyle>
-          <a:p>
-            <a:pPr lvl="0"/>
-            <a:r>
-              <a:rPr lang="en-US" smtClean="0"/>
-              <a:t>Click to edit Master text styles</a:t>
-            </a:r>
+            <a:endParaRPr kumimoji="0" lang="en-US"/>
           </a:p>
         </p:txBody>
       </p:sp>
@@ -2295,7 +2602,12 @@
             <p:ph type="sldNum" sz="quarter" idx="12"/>
           </p:nvPr>
         </p:nvSpPr>
-        <p:spPr/>
+        <p:spPr>
+          <a:xfrm>
+            <a:off x="8156448" y="6422064"/>
+            <a:ext cx="762000" cy="365125"/>
+          </a:xfrm>
+        </p:spPr>
         <p:txBody>
           <a:bodyPr/>
           <a:lstStyle/>
@@ -2309,11 +2621,6 @@
         </p:txBody>
       </p:sp>
     </p:spTree>
-    <p:extLst>
-      <p:ext uri="{BB962C8B-B14F-4D97-AF65-F5344CB8AC3E}">
-        <p14:creationId xmlns:p14="http://schemas.microsoft.com/office/powerpoint/2010/main" val="4001369364"/>
-      </p:ext>
-    </p:extLst>
   </p:cSld>
   <p:clrMapOvr>
     <a:masterClrMapping/>
@@ -2322,7 +2629,7 @@
 </file>
 
 <file path=ppt/slideLayouts/slideLayout9.xml><?xml version="1.0" encoding="utf-8"?>
-<p:sldLayout xmlns:a="http://schemas.openxmlformats.org/drawingml/2006/main" xmlns:r="http://schemas.openxmlformats.org/officeDocument/2006/relationships" xmlns:p="http://schemas.openxmlformats.org/presentationml/2006/main" type="picTx" preserve="1">
+<p:sldLayout xmlns:a="http://schemas.openxmlformats.org/drawingml/2006/main" xmlns:r="http://schemas.openxmlformats.org/officeDocument/2006/relationships" xmlns:p="http://schemas.openxmlformats.org/presentationml/2006/main" showMasterSp="0" type="picTx" preserve="1">
   <p:cSld name="Picture with Caption">
     <p:spTree>
       <p:nvGrpSpPr>
@@ -2350,23 +2657,28 @@
         </p:nvSpPr>
         <p:spPr>
           <a:xfrm>
-            <a:off x="1792288" y="4800600"/>
-            <a:ext cx="5486400" cy="566738"/>
+            <a:off x="5556732" y="1705709"/>
+            <a:ext cx="3053868" cy="1253808"/>
           </a:xfrm>
         </p:spPr>
         <p:txBody>
           <a:bodyPr anchor="b"/>
           <a:lstStyle>
             <a:lvl1pPr algn="l">
-              <a:defRPr sz="2000" b="1"/>
+              <a:buNone/>
+              <a:defRPr sz="2200" b="1">
+                <a:solidFill>
+                  <a:schemeClr val="accent1"/>
+                </a:solidFill>
+              </a:defRPr>
             </a:lvl1pPr>
           </a:lstStyle>
           <a:p>
             <a:r>
-              <a:rPr lang="en-US" smtClean="0"/>
+              <a:rPr kumimoji="0" lang="en-US" smtClean="0"/>
               <a:t>Click to edit Master title style</a:t>
             </a:r>
-            <a:endParaRPr lang="en-US"/>
+            <a:endParaRPr kumimoji="0" lang="en-US"/>
           </a:p>
         </p:txBody>
       </p:sp>
@@ -2382,9 +2694,44 @@
         </p:nvSpPr>
         <p:spPr>
           <a:xfrm>
-            <a:off x="1792288" y="612775"/>
-            <a:ext cx="5486400" cy="4114800"/>
+            <a:off x="1065628" y="1019907"/>
+            <a:ext cx="4114800" cy="4114800"/>
           </a:xfrm>
+          <a:prstGeom prst="ellipse">
+            <a:avLst/>
+          </a:prstGeom>
+          <a:solidFill>
+            <a:schemeClr val="bg2">
+              <a:shade val="50000"/>
+            </a:schemeClr>
+          </a:solidFill>
+          <a:ln w="50800" cap="flat">
+            <a:solidFill>
+              <a:schemeClr val="bg2"/>
+            </a:solidFill>
+            <a:miter lim="800000"/>
+          </a:ln>
+          <a:effectLst>
+            <a:outerShdw blurRad="152000" dist="345000" dir="5400000" sx="-80000" sy="-18000" rotWithShape="0">
+              <a:srgbClr val="000000">
+                <a:alpha val="25000"/>
+              </a:srgbClr>
+            </a:outerShdw>
+          </a:effectLst>
+          <a:scene3d>
+            <a:camera prst="orthographicFront"/>
+            <a:lightRig rig="contrasting" dir="t">
+              <a:rot lat="0" lon="0" rev="2400000"/>
+            </a:lightRig>
+          </a:scene3d>
+          <a:sp3d contourW="7620">
+            <a:bevelT w="63500" h="63500"/>
+            <a:contourClr>
+              <a:schemeClr val="bg2">
+                <a:shade val="50000"/>
+              </a:schemeClr>
+            </a:contourClr>
+          </a:sp3d>
         </p:spPr>
         <p:txBody>
           <a:bodyPr/>
@@ -2393,41 +2740,13 @@
               <a:buNone/>
               <a:defRPr sz="3200"/>
             </a:lvl1pPr>
-            <a:lvl2pPr marL="457200" indent="0">
-              <a:buNone/>
-              <a:defRPr sz="2800"/>
-            </a:lvl2pPr>
-            <a:lvl3pPr marL="914400" indent="0">
-              <a:buNone/>
-              <a:defRPr sz="2400"/>
-            </a:lvl3pPr>
-            <a:lvl4pPr marL="1371600" indent="0">
-              <a:buNone/>
-              <a:defRPr sz="2000"/>
-            </a:lvl4pPr>
-            <a:lvl5pPr marL="1828800" indent="0">
-              <a:buNone/>
-              <a:defRPr sz="2000"/>
-            </a:lvl5pPr>
-            <a:lvl6pPr marL="2286000" indent="0">
-              <a:buNone/>
-              <a:defRPr sz="2000"/>
-            </a:lvl6pPr>
-            <a:lvl7pPr marL="2743200" indent="0">
-              <a:buNone/>
-              <a:defRPr sz="2000"/>
-            </a:lvl7pPr>
-            <a:lvl8pPr marL="3200400" indent="0">
-              <a:buNone/>
-              <a:defRPr sz="2000"/>
-            </a:lvl8pPr>
-            <a:lvl9pPr marL="3657600" indent="0">
-              <a:buNone/>
-              <a:defRPr sz="2000"/>
-            </a:lvl9pPr>
           </a:lstStyle>
           <a:p>
-            <a:endParaRPr lang="en-US"/>
+            <a:r>
+              <a:rPr kumimoji="0" lang="en-US" smtClean="0"/>
+              <a:t>Click icon to add picture</a:t>
+            </a:r>
+            <a:endParaRPr kumimoji="0" lang="en-US" dirty="0"/>
           </a:p>
         </p:txBody>
       </p:sp>
@@ -2443,54 +2762,43 @@
         </p:nvSpPr>
         <p:spPr>
           <a:xfrm>
-            <a:off x="1792288" y="5367338"/>
-            <a:ext cx="5486400" cy="804862"/>
+            <a:off x="5556734" y="2998765"/>
+            <a:ext cx="3053866" cy="2663482"/>
           </a:xfrm>
         </p:spPr>
         <p:txBody>
-          <a:bodyPr/>
+          <a:bodyPr lIns="45720" rIns="45720"/>
           <a:lstStyle>
             <a:lvl1pPr marL="0" indent="0">
+              <a:buFontTx/>
               <a:buNone/>
-              <a:defRPr sz="1400"/>
+              <a:defRPr sz="1200"/>
             </a:lvl1pPr>
-            <a:lvl2pPr marL="457200" indent="0">
+            <a:lvl2pPr>
+              <a:buFontTx/>
               <a:buNone/>
               <a:defRPr sz="1200"/>
             </a:lvl2pPr>
-            <a:lvl3pPr marL="914400" indent="0">
+            <a:lvl3pPr>
+              <a:buFontTx/>
               <a:buNone/>
               <a:defRPr sz="1000"/>
             </a:lvl3pPr>
-            <a:lvl4pPr marL="1371600" indent="0">
+            <a:lvl4pPr>
+              <a:buFontTx/>
               <a:buNone/>
               <a:defRPr sz="900"/>
             </a:lvl4pPr>
-            <a:lvl5pPr marL="1828800" indent="0">
+            <a:lvl5pPr>
+              <a:buFontTx/>
               <a:buNone/>
               <a:defRPr sz="900"/>
             </a:lvl5pPr>
-            <a:lvl6pPr marL="2286000" indent="0">
-              <a:buNone/>
-              <a:defRPr sz="900"/>
-            </a:lvl6pPr>
-            <a:lvl7pPr marL="2743200" indent="0">
-              <a:buNone/>
-              <a:defRPr sz="900"/>
-            </a:lvl7pPr>
-            <a:lvl8pPr marL="3200400" indent="0">
-              <a:buNone/>
-              <a:defRPr sz="900"/>
-            </a:lvl8pPr>
-            <a:lvl9pPr marL="3657600" indent="0">
-              <a:buNone/>
-              <a:defRPr sz="900"/>
-            </a:lvl9pPr>
           </a:lstStyle>
           <a:p>
-            <a:pPr lvl="0"/>
-            <a:r>
-              <a:rPr lang="en-US" smtClean="0"/>
+            <a:pPr lvl="0" eaLnBrk="1" latinLnBrk="0" hangingPunct="1"/>
+            <a:r>
+              <a:rPr kumimoji="0" lang="en-US" smtClean="0"/>
               <a:t>Click to edit Master text styles</a:t>
             </a:r>
           </a:p>
@@ -2506,7 +2814,12 @@
             <p:ph type="dt" sz="half" idx="10"/>
           </p:nvPr>
         </p:nvSpPr>
-        <p:spPr/>
+        <p:spPr>
+          <a:xfrm>
+            <a:off x="457200" y="6422064"/>
+            <a:ext cx="2133600" cy="365125"/>
+          </a:xfrm>
+        </p:spPr>
         <p:txBody>
           <a:bodyPr/>
           <a:lstStyle/>
@@ -2562,11 +2875,6 @@
         </p:txBody>
       </p:sp>
     </p:spTree>
-    <p:extLst>
-      <p:ext uri="{BB962C8B-B14F-4D97-AF65-F5344CB8AC3E}">
-        <p14:creationId xmlns:p14="http://schemas.microsoft.com/office/powerpoint/2010/main" val="2017323678"/>
-      </p:ext>
-    </p:extLst>
   </p:cSld>
   <p:clrMapOvr>
     <a:masterClrMapping/>
@@ -2579,7 +2887,7 @@
   <p:cSld>
     <p:bg>
       <p:bgRef idx="1001">
-        <a:schemeClr val="bg1"/>
+        <a:schemeClr val="bg2"/>
       </p:bgRef>
     </p:bg>
     <p:spTree>
@@ -2598,7 +2906,203 @@
       </p:grpSpPr>
       <p:sp>
         <p:nvSpPr>
-          <p:cNvPr id="2" name="Title Placeholder 1"/>
+          <p:cNvPr id="12" name="Freeform 11"/>
+          <p:cNvSpPr>
+            <a:spLocks/>
+          </p:cNvSpPr>
+          <p:nvPr/>
+        </p:nvSpPr>
+        <p:spPr bwMode="auto">
+          <a:xfrm>
+            <a:off x="0" y="4752126"/>
+            <a:ext cx="9144000" cy="2112962"/>
+          </a:xfrm>
+          <a:custGeom>
+            <a:avLst>
+              <a:gd name="A1" fmla="val 0"/>
+              <a:gd name="A2" fmla="val 0"/>
+              <a:gd name="A3" fmla="val 0"/>
+              <a:gd name="A4" fmla="val 0"/>
+              <a:gd name="A5" fmla="val 0"/>
+              <a:gd name="A6" fmla="val 0"/>
+              <a:gd name="A7" fmla="val 0"/>
+              <a:gd name="A8" fmla="val 0"/>
+            </a:avLst>
+            <a:gdLst/>
+            <a:ahLst/>
+            <a:cxnLst>
+              <a:cxn ang="0">
+                <a:pos x="0" y="1066"/>
+              </a:cxn>
+              <a:cxn ang="0">
+                <a:pos x="0" y="1331"/>
+              </a:cxn>
+              <a:cxn ang="0">
+                <a:pos x="5760" y="1331"/>
+              </a:cxn>
+              <a:cxn ang="0">
+                <a:pos x="5760" y="0"/>
+              </a:cxn>
+              <a:cxn ang="0">
+                <a:pos x="0" y="1066"/>
+              </a:cxn>
+            </a:cxnLst>
+            <a:rect l="0" t="0" r="0" b="0"/>
+            <a:pathLst>
+              <a:path w="5760" h="1331">
+                <a:moveTo>
+                  <a:pt x="0" y="1066"/>
+                </a:moveTo>
+                <a:lnTo>
+                  <a:pt x="0" y="1331"/>
+                </a:lnTo>
+                <a:lnTo>
+                  <a:pt x="5760" y="1331"/>
+                </a:lnTo>
+                <a:lnTo>
+                  <a:pt x="5760" y="0"/>
+                </a:lnTo>
+                <a:cubicBezTo>
+                  <a:pt x="3220" y="1206"/>
+                  <a:pt x="2250" y="1146"/>
+                  <a:pt x="0" y="1066"/>
+                </a:cubicBezTo>
+                <a:close/>
+              </a:path>
+            </a:pathLst>
+          </a:custGeom>
+          <a:solidFill>
+            <a:schemeClr val="bg1">
+              <a:tint val="80000"/>
+              <a:satMod val="200000"/>
+              <a:alpha val="45000"/>
+            </a:schemeClr>
+          </a:solidFill>
+          <a:ln w="9525" cap="flat" cmpd="sng" algn="ctr">
+            <a:noFill/>
+            <a:prstDash val="solid"/>
+            <a:round/>
+            <a:headEnd type="none" w="med" len="med"/>
+            <a:tailEnd type="none" w="med" len="med"/>
+          </a:ln>
+          <a:effectLst>
+            <a:outerShdw blurRad="50800" dist="44450" dir="16200000" algn="ctr" rotWithShape="0">
+              <a:prstClr val="black">
+                <a:alpha val="35000"/>
+              </a:prstClr>
+            </a:outerShdw>
+          </a:effectLst>
+        </p:spPr>
+        <p:txBody>
+          <a:bodyPr vert="horz" wrap="square" lIns="91440" tIns="45720" rIns="91440" bIns="45720" anchor="t" compatLnSpc="1"/>
+          <a:lstStyle/>
+          <a:p>
+            <a:endParaRPr kumimoji="0" lang="en-US"/>
+          </a:p>
+        </p:txBody>
+      </p:sp>
+      <p:sp>
+        <p:nvSpPr>
+          <p:cNvPr id="16" name="Freeform 15"/>
+          <p:cNvSpPr>
+            <a:spLocks/>
+          </p:cNvSpPr>
+          <p:nvPr/>
+        </p:nvSpPr>
+        <p:spPr bwMode="auto">
+          <a:xfrm>
+            <a:off x="7315200" y="0"/>
+            <a:ext cx="1828800" cy="6858000"/>
+          </a:xfrm>
+          <a:custGeom>
+            <a:avLst/>
+            <a:gdLst>
+              <a:gd name="connsiteX0" fmla="*/ 1914 w 1914"/>
+              <a:gd name="connsiteY0" fmla="*/ 9 h 4329"/>
+              <a:gd name="connsiteX1" fmla="*/ 1914 w 1914"/>
+              <a:gd name="connsiteY1" fmla="*/ 4329 h 4329"/>
+              <a:gd name="connsiteX2" fmla="*/ 204 w 1914"/>
+              <a:gd name="connsiteY2" fmla="*/ 4327 h 4329"/>
+              <a:gd name="connsiteX3" fmla="*/ 0 w 1914"/>
+              <a:gd name="connsiteY3" fmla="*/ 0 h 4329"/>
+              <a:gd name="connsiteX4" fmla="*/ 1914 w 1914"/>
+              <a:gd name="connsiteY4" fmla="*/ 9 h 4329"/>
+            </a:gdLst>
+            <a:ahLst/>
+            <a:cxnLst>
+              <a:cxn ang="0">
+                <a:pos x="connsiteX0" y="connsiteY0"/>
+              </a:cxn>
+              <a:cxn ang="0">
+                <a:pos x="connsiteX1" y="connsiteY1"/>
+              </a:cxn>
+              <a:cxn ang="0">
+                <a:pos x="connsiteX2" y="connsiteY2"/>
+              </a:cxn>
+              <a:cxn ang="0">
+                <a:pos x="connsiteX3" y="connsiteY3"/>
+              </a:cxn>
+              <a:cxn ang="0">
+                <a:pos x="connsiteX4" y="connsiteY4"/>
+              </a:cxn>
+            </a:cxnLst>
+            <a:rect l="l" t="t" r="r" b="b"/>
+            <a:pathLst>
+              <a:path w="1914" h="4329">
+                <a:moveTo>
+                  <a:pt x="1914" y="9"/>
+                </a:moveTo>
+                <a:lnTo>
+                  <a:pt x="1914" y="4329"/>
+                </a:lnTo>
+                <a:lnTo>
+                  <a:pt x="204" y="4327"/>
+                </a:lnTo>
+                <a:cubicBezTo>
+                  <a:pt x="1288" y="3574"/>
+                  <a:pt x="2082" y="1734"/>
+                  <a:pt x="0" y="0"/>
+                </a:cubicBezTo>
+                <a:lnTo>
+                  <a:pt x="1914" y="9"/>
+                </a:lnTo>
+                <a:close/>
+              </a:path>
+            </a:pathLst>
+          </a:custGeom>
+          <a:solidFill>
+            <a:schemeClr val="bg1">
+              <a:tint val="90000"/>
+              <a:satMod val="350000"/>
+              <a:alpha val="40000"/>
+            </a:schemeClr>
+          </a:solidFill>
+          <a:ln w="9525" cap="flat" cmpd="sng" algn="ctr">
+            <a:noFill/>
+            <a:prstDash val="solid"/>
+            <a:round/>
+            <a:headEnd type="none" w="med" len="med"/>
+            <a:tailEnd type="none" w="med" len="med"/>
+          </a:ln>
+          <a:effectLst>
+            <a:outerShdw blurRad="50800" dist="50800" dir="10800000" algn="ctr" rotWithShape="0">
+              <a:prstClr val="black">
+                <a:alpha val="45000"/>
+              </a:prstClr>
+            </a:outerShdw>
+          </a:effectLst>
+        </p:spPr>
+        <p:txBody>
+          <a:bodyPr vert="horz" wrap="square" lIns="91440" tIns="45720" rIns="91440" bIns="45720" anchor="t" compatLnSpc="1"/>
+          <a:lstStyle/>
+          <a:p>
+            <a:endParaRPr kumimoji="0" lang="en-US"/>
+          </a:p>
+        </p:txBody>
+      </p:sp>
+      <p:sp>
+        <p:nvSpPr>
+          <p:cNvPr id="9" name="Title Placeholder 8"/>
           <p:cNvSpPr>
             <a:spLocks noGrp="1"/>
           </p:cNvSpPr>
@@ -2609,29 +3113,29 @@
         <p:spPr>
           <a:xfrm>
             <a:off x="457200" y="274638"/>
-            <a:ext cx="8229600" cy="1143000"/>
+            <a:ext cx="7467600" cy="1143000"/>
           </a:xfrm>
           <a:prstGeom prst="rect">
             <a:avLst/>
           </a:prstGeom>
         </p:spPr>
         <p:txBody>
-          <a:bodyPr vert="horz" lIns="91440" tIns="45720" rIns="91440" bIns="45720" rtlCol="0" anchor="ctr">
+          <a:bodyPr vert="horz" lIns="45720" rIns="45720" anchor="ctr">
             <a:normAutofit/>
           </a:bodyPr>
           <a:lstStyle/>
           <a:p>
             <a:r>
-              <a:rPr lang="en-US" smtClean="0"/>
+              <a:rPr kumimoji="0" lang="en-US" smtClean="0"/>
               <a:t>Click to edit Master title style</a:t>
             </a:r>
-            <a:endParaRPr lang="en-US"/>
-          </a:p>
-        </p:txBody>
-      </p:sp>
-      <p:sp>
-        <p:nvSpPr>
-          <p:cNvPr id="3" name="Text Placeholder 2"/>
+            <a:endParaRPr kumimoji="0" lang="en-US"/>
+          </a:p>
+        </p:txBody>
+      </p:sp>
+      <p:sp>
+        <p:nvSpPr>
+          <p:cNvPr id="30" name="Text Placeholder 29"/>
           <p:cNvSpPr>
             <a:spLocks noGrp="1"/>
           </p:cNvSpPr>
@@ -2642,58 +3146,58 @@
         <p:spPr>
           <a:xfrm>
             <a:off x="457200" y="1600200"/>
-            <a:ext cx="8229600" cy="4525963"/>
+            <a:ext cx="7467600" cy="4525963"/>
           </a:xfrm>
           <a:prstGeom prst="rect">
             <a:avLst/>
           </a:prstGeom>
         </p:spPr>
         <p:txBody>
-          <a:bodyPr vert="horz" lIns="91440" tIns="45720" rIns="91440" bIns="45720" rtlCol="0">
+          <a:bodyPr vert="horz">
             <a:normAutofit/>
           </a:bodyPr>
           <a:lstStyle/>
           <a:p>
-            <a:pPr lvl="0"/>
-            <a:r>
-              <a:rPr lang="en-US" smtClean="0"/>
+            <a:pPr lvl="0" eaLnBrk="1" latinLnBrk="0" hangingPunct="1"/>
+            <a:r>
+              <a:rPr kumimoji="0" lang="en-US" smtClean="0"/>
               <a:t>Click to edit Master text styles</a:t>
             </a:r>
           </a:p>
           <a:p>
-            <a:pPr lvl="1"/>
-            <a:r>
-              <a:rPr lang="en-US" smtClean="0"/>
+            <a:pPr lvl="1" eaLnBrk="1" latinLnBrk="0" hangingPunct="1"/>
+            <a:r>
+              <a:rPr kumimoji="0" lang="en-US" smtClean="0"/>
               <a:t>Second level</a:t>
             </a:r>
           </a:p>
           <a:p>
-            <a:pPr lvl="2"/>
-            <a:r>
-              <a:rPr lang="en-US" smtClean="0"/>
+            <a:pPr lvl="2" eaLnBrk="1" latinLnBrk="0" hangingPunct="1"/>
+            <a:r>
+              <a:rPr kumimoji="0" lang="en-US" smtClean="0"/>
               <a:t>Third level</a:t>
             </a:r>
           </a:p>
           <a:p>
-            <a:pPr lvl="3"/>
-            <a:r>
-              <a:rPr lang="en-US" smtClean="0"/>
+            <a:pPr lvl="3" eaLnBrk="1" latinLnBrk="0" hangingPunct="1"/>
+            <a:r>
+              <a:rPr kumimoji="0" lang="en-US" smtClean="0"/>
               <a:t>Fourth level</a:t>
             </a:r>
           </a:p>
           <a:p>
-            <a:pPr lvl="4"/>
-            <a:r>
-              <a:rPr lang="en-US" smtClean="0"/>
+            <a:pPr lvl="4" eaLnBrk="1" latinLnBrk="0" hangingPunct="1"/>
+            <a:r>
+              <a:rPr kumimoji="0" lang="en-US" smtClean="0"/>
               <a:t>Fifth level</a:t>
             </a:r>
-            <a:endParaRPr lang="en-US"/>
-          </a:p>
-        </p:txBody>
-      </p:sp>
-      <p:sp>
-        <p:nvSpPr>
-          <p:cNvPr id="4" name="Date Placeholder 3"/>
+            <a:endParaRPr kumimoji="0" lang="en-US"/>
+          </a:p>
+        </p:txBody>
+      </p:sp>
+      <p:sp>
+        <p:nvSpPr>
+          <p:cNvPr id="10" name="Date Placeholder 9"/>
           <p:cNvSpPr>
             <a:spLocks noGrp="1"/>
           </p:cNvSpPr>
@@ -2703,7 +3207,7 @@
         </p:nvSpPr>
         <p:spPr>
           <a:xfrm>
-            <a:off x="457200" y="6356350"/>
+            <a:off x="457200" y="6422064"/>
             <a:ext cx="2133600" cy="365125"/>
           </a:xfrm>
           <a:prstGeom prst="rect">
@@ -2711,13 +3215,13 @@
           </a:prstGeom>
         </p:spPr>
         <p:txBody>
-          <a:bodyPr vert="horz" lIns="91440" tIns="45720" rIns="91440" bIns="45720" rtlCol="0" anchor="ctr"/>
+          <a:bodyPr vert="horz" bIns="0" anchor="b"/>
           <a:lstStyle>
-            <a:lvl1pPr algn="l">
-              <a:defRPr sz="1200">
+            <a:lvl1pPr algn="l" eaLnBrk="1" latinLnBrk="0" hangingPunct="1">
+              <a:defRPr kumimoji="0" sz="1000">
                 <a:solidFill>
-                  <a:schemeClr val="tx1">
-                    <a:tint val="75000"/>
+                  <a:schemeClr val="tx2">
+                    <a:shade val="50000"/>
                   </a:schemeClr>
                 </a:solidFill>
               </a:defRPr>
@@ -2734,7 +3238,7 @@
       </p:sp>
       <p:sp>
         <p:nvSpPr>
-          <p:cNvPr id="5" name="Footer Placeholder 4"/>
+          <p:cNvPr id="22" name="Footer Placeholder 21"/>
           <p:cNvSpPr>
             <a:spLocks noGrp="1"/>
           </p:cNvSpPr>
@@ -2744,7 +3248,7 @@
         </p:nvSpPr>
         <p:spPr>
           <a:xfrm>
-            <a:off x="3124200" y="6356350"/>
+            <a:off x="3124200" y="6422064"/>
             <a:ext cx="2895600" cy="365125"/>
           </a:xfrm>
           <a:prstGeom prst="rect">
@@ -2752,13 +3256,13 @@
           </a:prstGeom>
         </p:spPr>
         <p:txBody>
-          <a:bodyPr vert="horz" lIns="91440" tIns="45720" rIns="91440" bIns="45720" rtlCol="0" anchor="ctr"/>
+          <a:bodyPr vert="horz" lIns="0" rIns="0" bIns="0" anchor="b"/>
           <a:lstStyle>
-            <a:lvl1pPr algn="ctr">
-              <a:defRPr sz="1200">
+            <a:lvl1pPr algn="ctr" eaLnBrk="1" latinLnBrk="0" hangingPunct="1">
+              <a:defRPr kumimoji="0" sz="1000">
                 <a:solidFill>
-                  <a:schemeClr val="tx1">
-                    <a:tint val="75000"/>
+                  <a:schemeClr val="tx2">
+                    <a:shade val="50000"/>
                   </a:schemeClr>
                 </a:solidFill>
               </a:defRPr>
@@ -2771,7 +3275,7 @@
       </p:sp>
       <p:sp>
         <p:nvSpPr>
-          <p:cNvPr id="6" name="Slide Number Placeholder 5"/>
+          <p:cNvPr id="18" name="Slide Number Placeholder 17"/>
           <p:cNvSpPr>
             <a:spLocks noGrp="1"/>
           </p:cNvSpPr>
@@ -2781,21 +3285,21 @@
         </p:nvSpPr>
         <p:spPr>
           <a:xfrm>
-            <a:off x="6553200" y="6356350"/>
-            <a:ext cx="2133600" cy="365125"/>
+            <a:off x="8153400" y="6422064"/>
+            <a:ext cx="762000" cy="365125"/>
           </a:xfrm>
           <a:prstGeom prst="rect">
             <a:avLst/>
           </a:prstGeom>
         </p:spPr>
         <p:txBody>
-          <a:bodyPr vert="horz" lIns="91440" tIns="45720" rIns="91440" bIns="45720" rtlCol="0" anchor="ctr"/>
+          <a:bodyPr vert="horz" lIns="0" tIns="0" rIns="0" bIns="0" anchor="b"/>
           <a:lstStyle>
-            <a:lvl1pPr algn="r">
-              <a:defRPr sz="1200">
+            <a:lvl1pPr algn="r" eaLnBrk="1" latinLnBrk="0" hangingPunct="1">
+              <a:defRPr kumimoji="0" sz="1000">
                 <a:solidFill>
-                  <a:schemeClr val="tx1">
-                    <a:tint val="75000"/>
+                  <a:schemeClr val="tx2">
+                    <a:shade val="50000"/>
                   </a:schemeClr>
                 </a:solidFill>
               </a:defRPr>
@@ -2811,34 +3315,29 @@
         </p:txBody>
       </p:sp>
     </p:spTree>
-    <p:extLst>
-      <p:ext uri="{BB962C8B-B14F-4D97-AF65-F5344CB8AC3E}">
-        <p14:creationId xmlns:p14="http://schemas.microsoft.com/office/powerpoint/2010/main" val="2449449728"/>
-      </p:ext>
-    </p:extLst>
   </p:cSld>
-  <p:clrMap bg1="lt1" tx1="dk1" bg2="lt2" tx2="dk2" accent1="accent1" accent2="accent2" accent3="accent3" accent4="accent4" accent5="accent5" accent6="accent6" hlink="hlink" folHlink="folHlink"/>
+  <p:clrMap bg1="dk1" tx1="lt1" bg2="dk2" tx2="lt2" accent1="accent1" accent2="accent2" accent3="accent3" accent4="accent4" accent5="accent5" accent6="accent6" hlink="hlink" folHlink="folHlink"/>
   <p:sldLayoutIdLst>
-    <p:sldLayoutId id="2147483649" r:id="rId1"/>
-    <p:sldLayoutId id="2147483650" r:id="rId2"/>
-    <p:sldLayoutId id="2147483651" r:id="rId3"/>
-    <p:sldLayoutId id="2147483652" r:id="rId4"/>
-    <p:sldLayoutId id="2147483653" r:id="rId5"/>
-    <p:sldLayoutId id="2147483654" r:id="rId6"/>
-    <p:sldLayoutId id="2147483655" r:id="rId7"/>
-    <p:sldLayoutId id="2147483656" r:id="rId8"/>
-    <p:sldLayoutId id="2147483657" r:id="rId9"/>
-    <p:sldLayoutId id="2147483658" r:id="rId10"/>
-    <p:sldLayoutId id="2147483659" r:id="rId11"/>
+    <p:sldLayoutId id="2147483709" r:id="rId1"/>
+    <p:sldLayoutId id="2147483710" r:id="rId2"/>
+    <p:sldLayoutId id="2147483711" r:id="rId3"/>
+    <p:sldLayoutId id="2147483712" r:id="rId4"/>
+    <p:sldLayoutId id="2147483713" r:id="rId5"/>
+    <p:sldLayoutId id="2147483714" r:id="rId6"/>
+    <p:sldLayoutId id="2147483715" r:id="rId7"/>
+    <p:sldLayoutId id="2147483716" r:id="rId8"/>
+    <p:sldLayoutId id="2147483717" r:id="rId9"/>
+    <p:sldLayoutId id="2147483718" r:id="rId10"/>
+    <p:sldLayoutId id="2147483719" r:id="rId11"/>
   </p:sldLayoutIdLst>
   <p:txStyles>
     <p:titleStyle>
-      <a:lvl1pPr algn="ctr" defTabSz="914400" rtl="0" eaLnBrk="1" latinLnBrk="0" hangingPunct="1">
+      <a:lvl1pPr algn="l" rtl="0" eaLnBrk="1" latinLnBrk="0" hangingPunct="1">
         <a:spcBef>
           <a:spcPct val="0"/>
         </a:spcBef>
         <a:buNone/>
-        <a:defRPr sz="4400" kern="1200">
+        <a:defRPr kumimoji="0" sz="4600" kern="1200">
           <a:solidFill>
             <a:schemeClr val="tx1"/>
           </a:solidFill>
@@ -2849,13 +3348,17 @@
       </a:lvl1pPr>
     </p:titleStyle>
     <p:bodyStyle>
-      <a:lvl1pPr marL="342900" indent="-342900" algn="l" defTabSz="914400" rtl="0" eaLnBrk="1" latinLnBrk="0" hangingPunct="1">
+      <a:lvl1pPr marL="420624" indent="-384048" algn="l" rtl="0" eaLnBrk="1" latinLnBrk="0" hangingPunct="1">
         <a:spcBef>
           <a:spcPct val="20000"/>
         </a:spcBef>
-        <a:buFont typeface="Arial" panose="020B0604020202020204" pitchFamily="34" charset="0"/>
-        <a:buChar char="•"/>
-        <a:defRPr sz="3200" kern="1200">
+        <a:buClr>
+          <a:schemeClr val="accent1"/>
+        </a:buClr>
+        <a:buSzPct val="80000"/>
+        <a:buFont typeface="Wingdings 2"/>
+        <a:buChar char=""/>
+        <a:defRPr kumimoji="0" sz="3000" kern="1200">
           <a:solidFill>
             <a:schemeClr val="tx1"/>
           </a:solidFill>
@@ -2864,13 +3367,17 @@
           <a:cs typeface="+mn-cs"/>
         </a:defRPr>
       </a:lvl1pPr>
-      <a:lvl2pPr marL="742950" indent="-285750" algn="l" defTabSz="914400" rtl="0" eaLnBrk="1" latinLnBrk="0" hangingPunct="1">
+      <a:lvl2pPr marL="722376" indent="-274320" algn="l" rtl="0" eaLnBrk="1" latinLnBrk="0" hangingPunct="1">
         <a:spcBef>
           <a:spcPct val="20000"/>
         </a:spcBef>
-        <a:buFont typeface="Arial" panose="020B0604020202020204" pitchFamily="34" charset="0"/>
-        <a:buChar char="–"/>
-        <a:defRPr sz="2800" kern="1200">
+        <a:buClr>
+          <a:schemeClr val="accent1"/>
+        </a:buClr>
+        <a:buSzPct val="90000"/>
+        <a:buFont typeface="Wingdings 2"/>
+        <a:buChar char=""/>
+        <a:defRPr kumimoji="0" sz="2600" kern="1200">
           <a:solidFill>
             <a:schemeClr val="tx1"/>
           </a:solidFill>
@@ -2879,13 +3386,17 @@
           <a:cs typeface="+mn-cs"/>
         </a:defRPr>
       </a:lvl2pPr>
-      <a:lvl3pPr marL="1143000" indent="-228600" algn="l" defTabSz="914400" rtl="0" eaLnBrk="1" latinLnBrk="0" hangingPunct="1">
+      <a:lvl3pPr marL="1005840" indent="-256032" algn="l" rtl="0" eaLnBrk="1" latinLnBrk="0" hangingPunct="1">
         <a:spcBef>
           <a:spcPct val="20000"/>
         </a:spcBef>
-        <a:buFont typeface="Arial" panose="020B0604020202020204" pitchFamily="34" charset="0"/>
-        <a:buChar char="•"/>
-        <a:defRPr sz="2400" kern="1200">
+        <a:buClr>
+          <a:schemeClr val="accent2"/>
+        </a:buClr>
+        <a:buSzPct val="85000"/>
+        <a:buFont typeface="Arial"/>
+        <a:buChar char="○"/>
+        <a:defRPr kumimoji="0" sz="2400" kern="1200">
           <a:solidFill>
             <a:schemeClr val="tx1"/>
           </a:solidFill>
@@ -2894,13 +3405,17 @@
           <a:cs typeface="+mn-cs"/>
         </a:defRPr>
       </a:lvl3pPr>
-      <a:lvl4pPr marL="1600200" indent="-228600" algn="l" defTabSz="914400" rtl="0" eaLnBrk="1" latinLnBrk="0" hangingPunct="1">
+      <a:lvl4pPr marL="1280160" indent="-237744" algn="l" rtl="0" eaLnBrk="1" latinLnBrk="0" hangingPunct="1">
         <a:spcBef>
           <a:spcPct val="20000"/>
         </a:spcBef>
-        <a:buFont typeface="Arial" panose="020B0604020202020204" pitchFamily="34" charset="0"/>
-        <a:buChar char="–"/>
-        <a:defRPr sz="2000" kern="1200">
+        <a:buClr>
+          <a:schemeClr val="accent3"/>
+        </a:buClr>
+        <a:buSzPct val="90000"/>
+        <a:buFont typeface="Wingdings 2"/>
+        <a:buChar char=""/>
+        <a:defRPr kumimoji="0" sz="2000" kern="1200">
           <a:solidFill>
             <a:schemeClr val="tx1"/>
           </a:solidFill>
@@ -2909,13 +3424,17 @@
           <a:cs typeface="+mn-cs"/>
         </a:defRPr>
       </a:lvl4pPr>
-      <a:lvl5pPr marL="2057400" indent="-228600" algn="l" defTabSz="914400" rtl="0" eaLnBrk="1" latinLnBrk="0" hangingPunct="1">
+      <a:lvl5pPr marL="1490472" indent="-182880" algn="l" rtl="0" eaLnBrk="1" latinLnBrk="0" hangingPunct="1">
         <a:spcBef>
           <a:spcPct val="20000"/>
         </a:spcBef>
-        <a:buFont typeface="Arial" panose="020B0604020202020204" pitchFamily="34" charset="0"/>
-        <a:buChar char="»"/>
-        <a:defRPr sz="2000" kern="1200">
+        <a:buClr>
+          <a:schemeClr val="accent4"/>
+        </a:buClr>
+        <a:buSzPct val="100000"/>
+        <a:buFont typeface="Arial"/>
+        <a:buChar char="-"/>
+        <a:defRPr kumimoji="0" sz="2000" kern="1200">
           <a:solidFill>
             <a:schemeClr val="tx1"/>
           </a:solidFill>
@@ -2924,13 +3443,16 @@
           <a:cs typeface="+mn-cs"/>
         </a:defRPr>
       </a:lvl5pPr>
-      <a:lvl6pPr marL="2514600" indent="-228600" algn="l" defTabSz="914400" rtl="0" eaLnBrk="1" latinLnBrk="0" hangingPunct="1">
+      <a:lvl6pPr marL="1700784" indent="-182880" algn="l" rtl="0" eaLnBrk="1" latinLnBrk="0" hangingPunct="1">
         <a:spcBef>
           <a:spcPct val="20000"/>
         </a:spcBef>
-        <a:buFont typeface="Arial" panose="020B0604020202020204" pitchFamily="34" charset="0"/>
-        <a:buChar char="•"/>
-        <a:defRPr sz="2000" kern="1200">
+        <a:buClr>
+          <a:schemeClr val="accent5"/>
+        </a:buClr>
+        <a:buFont typeface="Arial"/>
+        <a:buChar char="-"/>
+        <a:defRPr kumimoji="0" sz="2000" kern="1200" baseline="0">
           <a:solidFill>
             <a:schemeClr val="tx1"/>
           </a:solidFill>
@@ -2939,13 +3461,17 @@
           <a:cs typeface="+mn-cs"/>
         </a:defRPr>
       </a:lvl6pPr>
-      <a:lvl7pPr marL="2971800" indent="-228600" algn="l" defTabSz="914400" rtl="0" eaLnBrk="1" latinLnBrk="0" hangingPunct="1">
+      <a:lvl7pPr marL="1920240" indent="-182880" algn="l" rtl="0" eaLnBrk="1" latinLnBrk="0" hangingPunct="1">
         <a:spcBef>
           <a:spcPct val="20000"/>
         </a:spcBef>
-        <a:buFont typeface="Arial" panose="020B0604020202020204" pitchFamily="34" charset="0"/>
+        <a:buClr>
+          <a:schemeClr val="accent6"/>
+        </a:buClr>
+        <a:buSzPct val="100000"/>
+        <a:buFont typeface="Arial"/>
         <a:buChar char="•"/>
-        <a:defRPr sz="2000" kern="1200">
+        <a:defRPr kumimoji="0" sz="1800" kern="1200" baseline="0">
           <a:solidFill>
             <a:schemeClr val="tx1"/>
           </a:solidFill>
@@ -2954,13 +3480,16 @@
           <a:cs typeface="+mn-cs"/>
         </a:defRPr>
       </a:lvl7pPr>
-      <a:lvl8pPr marL="3429000" indent="-228600" algn="l" defTabSz="914400" rtl="0" eaLnBrk="1" latinLnBrk="0" hangingPunct="1">
+      <a:lvl8pPr marL="2139696" indent="-182880" algn="l" rtl="0" eaLnBrk="1" latinLnBrk="0" hangingPunct="1">
         <a:spcBef>
           <a:spcPct val="20000"/>
         </a:spcBef>
-        <a:buFont typeface="Arial" panose="020B0604020202020204" pitchFamily="34" charset="0"/>
-        <a:buChar char="•"/>
-        <a:defRPr sz="2000" kern="1200">
+        <a:buClr>
+          <a:schemeClr val="accent6"/>
+        </a:buClr>
+        <a:buFont typeface="Arial"/>
+        <a:buChar char="▪"/>
+        <a:defRPr kumimoji="0" sz="1600" kern="1200">
           <a:solidFill>
             <a:schemeClr val="tx1"/>
           </a:solidFill>
@@ -2969,13 +3498,16 @@
           <a:cs typeface="+mn-cs"/>
         </a:defRPr>
       </a:lvl8pPr>
-      <a:lvl9pPr marL="3886200" indent="-228600" algn="l" defTabSz="914400" rtl="0" eaLnBrk="1" latinLnBrk="0" hangingPunct="1">
+      <a:lvl9pPr marL="2331720" indent="-182880" algn="l" rtl="0" eaLnBrk="1" latinLnBrk="0" hangingPunct="1">
         <a:spcBef>
           <a:spcPct val="20000"/>
         </a:spcBef>
-        <a:buFont typeface="Arial" panose="020B0604020202020204" pitchFamily="34" charset="0"/>
+        <a:buClr>
+          <a:schemeClr val="accent6"/>
+        </a:buClr>
+        <a:buFont typeface="Arial"/>
         <a:buChar char="•"/>
-        <a:defRPr sz="2000" kern="1200">
+        <a:defRPr kumimoji="0" sz="1600" kern="1200">
           <a:solidFill>
             <a:schemeClr val="tx1"/>
           </a:solidFill>
@@ -2986,11 +3518,8 @@
       </a:lvl9pPr>
     </p:bodyStyle>
     <p:otherStyle>
-      <a:defPPr>
-        <a:defRPr lang="en-US"/>
-      </a:defPPr>
-      <a:lvl1pPr marL="0" algn="l" defTabSz="914400" rtl="0" eaLnBrk="1" latinLnBrk="0" hangingPunct="1">
-        <a:defRPr sz="1800" kern="1200">
+      <a:lvl1pPr marL="0" algn="l" rtl="0" eaLnBrk="1" latinLnBrk="0" hangingPunct="1">
+        <a:defRPr kumimoji="0" kern="1200">
           <a:solidFill>
             <a:schemeClr val="tx1"/>
           </a:solidFill>
@@ -2999,8 +3528,8 @@
           <a:cs typeface="+mn-cs"/>
         </a:defRPr>
       </a:lvl1pPr>
-      <a:lvl2pPr marL="457200" algn="l" defTabSz="914400" rtl="0" eaLnBrk="1" latinLnBrk="0" hangingPunct="1">
-        <a:defRPr sz="1800" kern="1200">
+      <a:lvl2pPr marL="457200" algn="l" rtl="0" eaLnBrk="1" latinLnBrk="0" hangingPunct="1">
+        <a:defRPr kumimoji="0" kern="1200">
           <a:solidFill>
             <a:schemeClr val="tx1"/>
           </a:solidFill>
@@ -3009,8 +3538,8 @@
           <a:cs typeface="+mn-cs"/>
         </a:defRPr>
       </a:lvl2pPr>
-      <a:lvl3pPr marL="914400" algn="l" defTabSz="914400" rtl="0" eaLnBrk="1" latinLnBrk="0" hangingPunct="1">
-        <a:defRPr sz="1800" kern="1200">
+      <a:lvl3pPr marL="914400" algn="l" rtl="0" eaLnBrk="1" latinLnBrk="0" hangingPunct="1">
+        <a:defRPr kumimoji="0" kern="1200">
           <a:solidFill>
             <a:schemeClr val="tx1"/>
           </a:solidFill>
@@ -3019,8 +3548,8 @@
           <a:cs typeface="+mn-cs"/>
         </a:defRPr>
       </a:lvl3pPr>
-      <a:lvl4pPr marL="1371600" algn="l" defTabSz="914400" rtl="0" eaLnBrk="1" latinLnBrk="0" hangingPunct="1">
-        <a:defRPr sz="1800" kern="1200">
+      <a:lvl4pPr marL="1371600" algn="l" rtl="0" eaLnBrk="1" latinLnBrk="0" hangingPunct="1">
+        <a:defRPr kumimoji="0" kern="1200">
           <a:solidFill>
             <a:schemeClr val="tx1"/>
           </a:solidFill>
@@ -3029,8 +3558,8 @@
           <a:cs typeface="+mn-cs"/>
         </a:defRPr>
       </a:lvl4pPr>
-      <a:lvl5pPr marL="1828800" algn="l" defTabSz="914400" rtl="0" eaLnBrk="1" latinLnBrk="0" hangingPunct="1">
-        <a:defRPr sz="1800" kern="1200">
+      <a:lvl5pPr marL="1828800" algn="l" rtl="0" eaLnBrk="1" latinLnBrk="0" hangingPunct="1">
+        <a:defRPr kumimoji="0" kern="1200">
           <a:solidFill>
             <a:schemeClr val="tx1"/>
           </a:solidFill>
@@ -3039,8 +3568,8 @@
           <a:cs typeface="+mn-cs"/>
         </a:defRPr>
       </a:lvl5pPr>
-      <a:lvl6pPr marL="2286000" algn="l" defTabSz="914400" rtl="0" eaLnBrk="1" latinLnBrk="0" hangingPunct="1">
-        <a:defRPr sz="1800" kern="1200">
+      <a:lvl6pPr marL="2286000" algn="l" rtl="0" eaLnBrk="1" latinLnBrk="0" hangingPunct="1">
+        <a:defRPr kumimoji="0" kern="1200">
           <a:solidFill>
             <a:schemeClr val="tx1"/>
           </a:solidFill>
@@ -3049,8 +3578,8 @@
           <a:cs typeface="+mn-cs"/>
         </a:defRPr>
       </a:lvl6pPr>
-      <a:lvl7pPr marL="2743200" algn="l" defTabSz="914400" rtl="0" eaLnBrk="1" latinLnBrk="0" hangingPunct="1">
-        <a:defRPr sz="1800" kern="1200">
+      <a:lvl7pPr marL="2743200" algn="l" rtl="0" eaLnBrk="1" latinLnBrk="0" hangingPunct="1">
+        <a:defRPr kumimoji="0" kern="1200">
           <a:solidFill>
             <a:schemeClr val="tx1"/>
           </a:solidFill>
@@ -3059,8 +3588,8 @@
           <a:cs typeface="+mn-cs"/>
         </a:defRPr>
       </a:lvl7pPr>
-      <a:lvl8pPr marL="3200400" algn="l" defTabSz="914400" rtl="0" eaLnBrk="1" latinLnBrk="0" hangingPunct="1">
-        <a:defRPr sz="1800" kern="1200">
+      <a:lvl8pPr marL="3200400" algn="l" rtl="0" eaLnBrk="1" latinLnBrk="0" hangingPunct="1">
+        <a:defRPr kumimoji="0" kern="1200">
           <a:solidFill>
             <a:schemeClr val="tx1"/>
           </a:solidFill>
@@ -3069,8 +3598,8 @@
           <a:cs typeface="+mn-cs"/>
         </a:defRPr>
       </a:lvl8pPr>
-      <a:lvl9pPr marL="3657600" algn="l" defTabSz="914400" rtl="0" eaLnBrk="1" latinLnBrk="0" hangingPunct="1">
-        <a:defRPr sz="1800" kern="1200">
+      <a:lvl9pPr marL="3657600" algn="l" rtl="0" eaLnBrk="1" latinLnBrk="0" hangingPunct="1">
+        <a:defRPr kumimoji="0" kern="1200">
           <a:solidFill>
             <a:schemeClr val="tx1"/>
           </a:solidFill>
@@ -3176,6 +3705,795 @@
 </p:sld>
 </file>
 
+<file path=ppt/slides/slide10.xml><?xml version="1.0" encoding="utf-8"?>
+<p:sld xmlns:a="http://schemas.openxmlformats.org/drawingml/2006/main" xmlns:r="http://schemas.openxmlformats.org/officeDocument/2006/relationships" xmlns:p="http://schemas.openxmlformats.org/presentationml/2006/main">
+  <p:cSld>
+    <p:spTree>
+      <p:nvGrpSpPr>
+        <p:cNvPr id="1" name=""/>
+        <p:cNvGrpSpPr/>
+        <p:nvPr/>
+      </p:nvGrpSpPr>
+      <p:grpSpPr>
+        <a:xfrm>
+          <a:off x="0" y="0"/>
+          <a:ext cx="0" cy="0"/>
+          <a:chOff x="0" y="0"/>
+          <a:chExt cx="0" cy="0"/>
+        </a:xfrm>
+      </p:grpSpPr>
+      <p:sp>
+        <p:nvSpPr>
+          <p:cNvPr id="2" name="Title 1"/>
+          <p:cNvSpPr>
+            <a:spLocks noGrp="1"/>
+          </p:cNvSpPr>
+          <p:nvPr>
+            <p:ph type="title"/>
+          </p:nvPr>
+        </p:nvSpPr>
+        <p:spPr/>
+        <p:txBody>
+          <a:bodyPr/>
+          <a:lstStyle/>
+          <a:p>
+            <a:r>
+              <a:rPr lang="en-US" dirty="0" err="1" smtClean="0"/>
+              <a:t>Matriz</a:t>
+            </a:r>
+            <a:r>
+              <a:rPr lang="en-US" dirty="0" smtClean="0"/>
+              <a:t> de </a:t>
+            </a:r>
+            <a:r>
+              <a:rPr lang="en-US" dirty="0" err="1" smtClean="0"/>
+              <a:t>modelo</a:t>
+            </a:r>
+            <a:endParaRPr lang="en-US" dirty="0"/>
+          </a:p>
+        </p:txBody>
+      </p:sp>
+      <p:sp>
+        <p:nvSpPr>
+          <p:cNvPr id="3" name="Content Placeholder 2"/>
+          <p:cNvSpPr>
+            <a:spLocks noGrp="1"/>
+          </p:cNvSpPr>
+          <p:nvPr>
+            <p:ph idx="1"/>
+          </p:nvPr>
+        </p:nvSpPr>
+        <p:spPr/>
+        <p:txBody>
+          <a:bodyPr/>
+          <a:lstStyle/>
+          <a:p>
+            <a:r>
+              <a:rPr lang="en-US" dirty="0" err="1" smtClean="0"/>
+              <a:t>Traslada</a:t>
+            </a:r>
+            <a:r>
+              <a:rPr lang="en-US" dirty="0" smtClean="0"/>
+              <a:t> </a:t>
+            </a:r>
+            <a:r>
+              <a:rPr lang="en-US" dirty="0" err="1" smtClean="0"/>
+              <a:t>los</a:t>
+            </a:r>
+            <a:r>
+              <a:rPr lang="en-US" dirty="0" smtClean="0"/>
+              <a:t> </a:t>
+            </a:r>
+            <a:r>
+              <a:rPr lang="en-US" dirty="0" err="1" smtClean="0"/>
+              <a:t>vértices</a:t>
+            </a:r>
+            <a:r>
+              <a:rPr lang="en-US" dirty="0" smtClean="0"/>
+              <a:t> de </a:t>
+            </a:r>
+            <a:r>
+              <a:rPr lang="en-US" dirty="0" err="1" smtClean="0"/>
+              <a:t>cada</a:t>
+            </a:r>
+            <a:r>
+              <a:rPr lang="en-US" dirty="0" smtClean="0"/>
+              <a:t> </a:t>
+            </a:r>
+            <a:r>
+              <a:rPr lang="en-US" dirty="0" err="1" smtClean="0"/>
+              <a:t>modelo</a:t>
+            </a:r>
+            <a:r>
+              <a:rPr lang="en-US" dirty="0" smtClean="0"/>
+              <a:t> para </a:t>
+            </a:r>
+            <a:r>
+              <a:rPr lang="en-US" dirty="0" err="1" smtClean="0"/>
+              <a:t>posicionarlos</a:t>
+            </a:r>
+            <a:r>
+              <a:rPr lang="en-US" dirty="0" smtClean="0"/>
+              <a:t> </a:t>
+            </a:r>
+            <a:r>
+              <a:rPr lang="en-US" dirty="0" err="1" smtClean="0"/>
+              <a:t>correctamente</a:t>
+            </a:r>
+            <a:r>
+              <a:rPr lang="en-US" dirty="0" smtClean="0"/>
+              <a:t> </a:t>
+            </a:r>
+            <a:r>
+              <a:rPr lang="en-US" dirty="0" err="1" smtClean="0"/>
+              <a:t>en</a:t>
+            </a:r>
+            <a:r>
+              <a:rPr lang="en-US" dirty="0" smtClean="0"/>
+              <a:t> el “</a:t>
+            </a:r>
+            <a:r>
+              <a:rPr lang="en-US" dirty="0" err="1" smtClean="0"/>
+              <a:t>mundo</a:t>
+            </a:r>
+            <a:r>
+              <a:rPr lang="en-US" dirty="0" smtClean="0"/>
+              <a:t>”</a:t>
+            </a:r>
+          </a:p>
+          <a:p>
+            <a:r>
+              <a:rPr lang="en-US" dirty="0" err="1" smtClean="0"/>
+              <a:t>Aplica</a:t>
+            </a:r>
+            <a:r>
+              <a:rPr lang="en-US" dirty="0" smtClean="0"/>
+              <a:t> la </a:t>
+            </a:r>
+            <a:r>
+              <a:rPr lang="en-US" dirty="0" err="1" smtClean="0"/>
+              <a:t>ubicación</a:t>
+            </a:r>
+            <a:r>
+              <a:rPr lang="en-US" dirty="0" smtClean="0"/>
+              <a:t>, </a:t>
+            </a:r>
+            <a:r>
+              <a:rPr lang="en-US" dirty="0" err="1" smtClean="0"/>
+              <a:t>rotación</a:t>
+            </a:r>
+            <a:r>
+              <a:rPr lang="en-US" dirty="0" smtClean="0"/>
+              <a:t> y </a:t>
+            </a:r>
+            <a:r>
+              <a:rPr lang="en-US" dirty="0" err="1" smtClean="0"/>
+              <a:t>escala</a:t>
+            </a:r>
+            <a:r>
+              <a:rPr lang="en-US" dirty="0" smtClean="0"/>
+              <a:t> del </a:t>
+            </a:r>
+            <a:r>
+              <a:rPr lang="en-US" dirty="0" err="1" smtClean="0"/>
+              <a:t>modelo</a:t>
+            </a:r>
+            <a:endParaRPr lang="en-US" dirty="0"/>
+          </a:p>
+        </p:txBody>
+      </p:sp>
+    </p:spTree>
+    <p:extLst>
+      <p:ext uri="{BB962C8B-B14F-4D97-AF65-F5344CB8AC3E}">
+        <p14:creationId xmlns:p14="http://schemas.microsoft.com/office/powerpoint/2010/main" val="3669938716"/>
+      </p:ext>
+    </p:extLst>
+  </p:cSld>
+  <p:clrMapOvr>
+    <a:masterClrMapping/>
+  </p:clrMapOvr>
+</p:sld>
+</file>
+
+<file path=ppt/slides/slide11.xml><?xml version="1.0" encoding="utf-8"?>
+<p:sld xmlns:a="http://schemas.openxmlformats.org/drawingml/2006/main" xmlns:r="http://schemas.openxmlformats.org/officeDocument/2006/relationships" xmlns:p="http://schemas.openxmlformats.org/presentationml/2006/main">
+  <p:cSld>
+    <p:spTree>
+      <p:nvGrpSpPr>
+        <p:cNvPr id="1" name=""/>
+        <p:cNvGrpSpPr/>
+        <p:nvPr/>
+      </p:nvGrpSpPr>
+      <p:grpSpPr>
+        <a:xfrm>
+          <a:off x="0" y="0"/>
+          <a:ext cx="0" cy="0"/>
+          <a:chOff x="0" y="0"/>
+          <a:chExt cx="0" cy="0"/>
+        </a:xfrm>
+      </p:grpSpPr>
+      <p:sp>
+        <p:nvSpPr>
+          <p:cNvPr id="2" name="Title 1"/>
+          <p:cNvSpPr>
+            <a:spLocks noGrp="1"/>
+          </p:cNvSpPr>
+          <p:nvPr>
+            <p:ph type="title"/>
+          </p:nvPr>
+        </p:nvSpPr>
+        <p:spPr/>
+        <p:txBody>
+          <a:bodyPr/>
+          <a:lstStyle/>
+          <a:p>
+            <a:r>
+              <a:rPr lang="en-US" dirty="0" err="1"/>
+              <a:t>Matriz</a:t>
+            </a:r>
+            <a:r>
+              <a:rPr lang="en-US" dirty="0"/>
+              <a:t> de </a:t>
+            </a:r>
+            <a:r>
+              <a:rPr lang="en-US" dirty="0" err="1"/>
+              <a:t>modelo</a:t>
+            </a:r>
+            <a:endParaRPr lang="en-US" dirty="0"/>
+          </a:p>
+        </p:txBody>
+      </p:sp>
+      <p:pic>
+        <p:nvPicPr>
+          <p:cNvPr id="6149" name="Picture 5"/>
+          <p:cNvPicPr>
+            <a:picLocks noGrp="1" noChangeAspect="1" noChangeArrowheads="1"/>
+          </p:cNvPicPr>
+          <p:nvPr>
+            <p:ph idx="1"/>
+          </p:nvPr>
+        </p:nvPicPr>
+        <p:blipFill>
+          <a:blip r:embed="rId2">
+            <a:extLst>
+              <a:ext uri="{28A0092B-C50C-407E-A947-70E740481C1C}">
+                <a14:useLocalDpi xmlns:a14="http://schemas.microsoft.com/office/drawing/2010/main" val="0"/>
+              </a:ext>
+            </a:extLst>
+          </a:blip>
+          <a:srcRect/>
+          <a:stretch>
+            <a:fillRect/>
+          </a:stretch>
+        </p:blipFill>
+        <p:spPr bwMode="auto">
+          <a:xfrm>
+            <a:off x="695350" y="1752600"/>
+            <a:ext cx="7698582" cy="4648200"/>
+          </a:xfrm>
+          <a:prstGeom prst="rect">
+            <a:avLst/>
+          </a:prstGeom>
+          <a:noFill/>
+          <a:ln>
+            <a:noFill/>
+          </a:ln>
+          <a:extLst>
+            <a:ext uri="{909E8E84-426E-40DD-AFC4-6F175D3DCCD1}">
+              <a14:hiddenFill xmlns:a14="http://schemas.microsoft.com/office/drawing/2010/main">
+                <a:solidFill>
+                  <a:schemeClr val="accent1"/>
+                </a:solidFill>
+              </a14:hiddenFill>
+            </a:ext>
+            <a:ext uri="{91240B29-F687-4F45-9708-019B960494DF}">
+              <a14:hiddenLine xmlns:a14="http://schemas.microsoft.com/office/drawing/2010/main" w="9525">
+                <a:solidFill>
+                  <a:schemeClr val="tx1"/>
+                </a:solidFill>
+                <a:miter lim="800000"/>
+                <a:headEnd/>
+                <a:tailEnd/>
+              </a14:hiddenLine>
+            </a:ext>
+          </a:extLst>
+        </p:spPr>
+      </p:pic>
+    </p:spTree>
+    <p:extLst>
+      <p:ext uri="{BB962C8B-B14F-4D97-AF65-F5344CB8AC3E}">
+        <p14:creationId xmlns:p14="http://schemas.microsoft.com/office/powerpoint/2010/main" val="1987058814"/>
+      </p:ext>
+    </p:extLst>
+  </p:cSld>
+  <p:clrMapOvr>
+    <a:masterClrMapping/>
+  </p:clrMapOvr>
+</p:sld>
+</file>
+
+<file path=ppt/slides/slide12.xml><?xml version="1.0" encoding="utf-8"?>
+<p:sld xmlns:a="http://schemas.openxmlformats.org/drawingml/2006/main" xmlns:r="http://schemas.openxmlformats.org/officeDocument/2006/relationships" xmlns:p="http://schemas.openxmlformats.org/presentationml/2006/main">
+  <p:cSld>
+    <p:spTree>
+      <p:nvGrpSpPr>
+        <p:cNvPr id="1" name=""/>
+        <p:cNvGrpSpPr/>
+        <p:nvPr/>
+      </p:nvGrpSpPr>
+      <p:grpSpPr>
+        <a:xfrm>
+          <a:off x="0" y="0"/>
+          <a:ext cx="0" cy="0"/>
+          <a:chOff x="0" y="0"/>
+          <a:chExt cx="0" cy="0"/>
+        </a:xfrm>
+      </p:grpSpPr>
+      <p:sp>
+        <p:nvSpPr>
+          <p:cNvPr id="2" name="Title 1"/>
+          <p:cNvSpPr>
+            <a:spLocks noGrp="1"/>
+          </p:cNvSpPr>
+          <p:nvPr>
+            <p:ph type="title"/>
+          </p:nvPr>
+        </p:nvSpPr>
+        <p:spPr/>
+        <p:txBody>
+          <a:bodyPr/>
+          <a:lstStyle/>
+          <a:p>
+            <a:r>
+              <a:rPr lang="en-US" dirty="0" err="1" smtClean="0"/>
+              <a:t>Matriz</a:t>
+            </a:r>
+            <a:r>
+              <a:rPr lang="en-US" dirty="0" smtClean="0"/>
+              <a:t> de vista</a:t>
+            </a:r>
+            <a:endParaRPr lang="en-US" dirty="0"/>
+          </a:p>
+        </p:txBody>
+      </p:sp>
+      <p:sp>
+        <p:nvSpPr>
+          <p:cNvPr id="3" name="Content Placeholder 2"/>
+          <p:cNvSpPr>
+            <a:spLocks noGrp="1"/>
+          </p:cNvSpPr>
+          <p:nvPr>
+            <p:ph idx="1"/>
+          </p:nvPr>
+        </p:nvSpPr>
+        <p:spPr/>
+        <p:txBody>
+          <a:bodyPr/>
+          <a:lstStyle/>
+          <a:p>
+            <a:r>
+              <a:rPr lang="en-US" dirty="0" err="1" smtClean="0"/>
+              <a:t>Traslada</a:t>
+            </a:r>
+            <a:r>
+              <a:rPr lang="en-US" dirty="0" smtClean="0"/>
+              <a:t> </a:t>
+            </a:r>
+            <a:r>
+              <a:rPr lang="en-US" dirty="0" err="1" smtClean="0"/>
+              <a:t>los</a:t>
+            </a:r>
+            <a:r>
+              <a:rPr lang="en-US" dirty="0" smtClean="0"/>
+              <a:t> </a:t>
+            </a:r>
+            <a:r>
+              <a:rPr lang="en-US" dirty="0" err="1" smtClean="0"/>
+              <a:t>vértices</a:t>
+            </a:r>
+            <a:r>
+              <a:rPr lang="en-US" dirty="0" smtClean="0"/>
+              <a:t> </a:t>
+            </a:r>
+            <a:r>
+              <a:rPr lang="en-US" dirty="0" err="1" smtClean="0"/>
+              <a:t>en</a:t>
+            </a:r>
+            <a:r>
+              <a:rPr lang="en-US" dirty="0" smtClean="0"/>
+              <a:t> el “</a:t>
+            </a:r>
+            <a:r>
+              <a:rPr lang="en-US" dirty="0" err="1" smtClean="0"/>
+              <a:t>mundo</a:t>
+            </a:r>
+            <a:r>
+              <a:rPr lang="en-US" dirty="0" smtClean="0"/>
+              <a:t>” para </a:t>
+            </a:r>
+            <a:r>
+              <a:rPr lang="en-US" dirty="0" err="1" smtClean="0"/>
+              <a:t>posicionarlos</a:t>
+            </a:r>
+            <a:r>
+              <a:rPr lang="en-US" dirty="0" smtClean="0"/>
+              <a:t> </a:t>
+            </a:r>
+            <a:r>
+              <a:rPr lang="en-US" dirty="0" err="1" smtClean="0"/>
+              <a:t>relativos</a:t>
+            </a:r>
+            <a:r>
+              <a:rPr lang="en-US" dirty="0" smtClean="0"/>
+              <a:t> al “</a:t>
+            </a:r>
+            <a:r>
+              <a:rPr lang="en-US" dirty="0" err="1" smtClean="0"/>
+              <a:t>ojo</a:t>
+            </a:r>
+            <a:r>
+              <a:rPr lang="en-US" dirty="0" smtClean="0"/>
+              <a:t>”</a:t>
+            </a:r>
+          </a:p>
+          <a:p>
+            <a:r>
+              <a:rPr lang="en-US" dirty="0" err="1" smtClean="0"/>
+              <a:t>Aplica</a:t>
+            </a:r>
+            <a:r>
+              <a:rPr lang="en-US" dirty="0" smtClean="0"/>
+              <a:t> (</a:t>
+            </a:r>
+            <a:r>
+              <a:rPr lang="en-US" dirty="0" err="1" smtClean="0"/>
+              <a:t>inversamente</a:t>
+            </a:r>
+            <a:r>
+              <a:rPr lang="en-US" dirty="0" smtClean="0"/>
+              <a:t>) la </a:t>
+            </a:r>
+            <a:r>
+              <a:rPr lang="en-US" dirty="0" err="1" smtClean="0"/>
+              <a:t>ubicación</a:t>
+            </a:r>
+            <a:r>
+              <a:rPr lang="en-US" dirty="0" smtClean="0"/>
+              <a:t> y </a:t>
+            </a:r>
+            <a:r>
+              <a:rPr lang="en-US" dirty="0" err="1" smtClean="0"/>
+              <a:t>rotación</a:t>
+            </a:r>
+            <a:r>
+              <a:rPr lang="en-US" dirty="0" smtClean="0"/>
+              <a:t> de </a:t>
+            </a:r>
+            <a:r>
+              <a:rPr lang="en-US" smtClean="0"/>
+              <a:t>la cámara</a:t>
+            </a:r>
+            <a:endParaRPr lang="en-US" dirty="0"/>
+          </a:p>
+        </p:txBody>
+      </p:sp>
+    </p:spTree>
+    <p:extLst>
+      <p:ext uri="{BB962C8B-B14F-4D97-AF65-F5344CB8AC3E}">
+        <p14:creationId xmlns:p14="http://schemas.microsoft.com/office/powerpoint/2010/main" val="3887254187"/>
+      </p:ext>
+    </p:extLst>
+  </p:cSld>
+  <p:clrMapOvr>
+    <a:masterClrMapping/>
+  </p:clrMapOvr>
+</p:sld>
+</file>
+
+<file path=ppt/slides/slide13.xml><?xml version="1.0" encoding="utf-8"?>
+<p:sld xmlns:a="http://schemas.openxmlformats.org/drawingml/2006/main" xmlns:r="http://schemas.openxmlformats.org/officeDocument/2006/relationships" xmlns:p="http://schemas.openxmlformats.org/presentationml/2006/main">
+  <p:cSld>
+    <p:spTree>
+      <p:nvGrpSpPr>
+        <p:cNvPr id="1" name=""/>
+        <p:cNvGrpSpPr/>
+        <p:nvPr/>
+      </p:nvGrpSpPr>
+      <p:grpSpPr>
+        <a:xfrm>
+          <a:off x="0" y="0"/>
+          <a:ext cx="0" cy="0"/>
+          <a:chOff x="0" y="0"/>
+          <a:chExt cx="0" cy="0"/>
+        </a:xfrm>
+      </p:grpSpPr>
+      <p:sp>
+        <p:nvSpPr>
+          <p:cNvPr id="2" name="Title 1"/>
+          <p:cNvSpPr>
+            <a:spLocks noGrp="1"/>
+          </p:cNvSpPr>
+          <p:nvPr>
+            <p:ph type="title"/>
+          </p:nvPr>
+        </p:nvSpPr>
+        <p:spPr/>
+        <p:txBody>
+          <a:bodyPr/>
+          <a:lstStyle/>
+          <a:p>
+            <a:r>
+              <a:rPr lang="en-US" dirty="0" err="1" smtClean="0"/>
+              <a:t>Proyección</a:t>
+            </a:r>
+            <a:endParaRPr lang="en-US" dirty="0"/>
+          </a:p>
+        </p:txBody>
+      </p:sp>
+      <p:sp>
+        <p:nvSpPr>
+          <p:cNvPr id="3" name="Content Placeholder 2"/>
+          <p:cNvSpPr>
+            <a:spLocks noGrp="1"/>
+          </p:cNvSpPr>
+          <p:nvPr>
+            <p:ph idx="1"/>
+          </p:nvPr>
+        </p:nvSpPr>
+        <p:spPr/>
+        <p:txBody>
+          <a:bodyPr/>
+          <a:lstStyle/>
+          <a:p>
+            <a:r>
+              <a:rPr lang="en-US" dirty="0" err="1" smtClean="0"/>
+              <a:t>Crear</a:t>
+            </a:r>
+            <a:r>
+              <a:rPr lang="en-US" dirty="0" smtClean="0"/>
+              <a:t> la </a:t>
+            </a:r>
+            <a:r>
+              <a:rPr lang="en-US" dirty="0" err="1" smtClean="0"/>
+              <a:t>impresión</a:t>
+            </a:r>
+            <a:r>
+              <a:rPr lang="en-US" dirty="0" smtClean="0"/>
+              <a:t> de 3 </a:t>
+            </a:r>
+            <a:r>
+              <a:rPr lang="en-US" dirty="0" err="1" smtClean="0"/>
+              <a:t>dimensiones</a:t>
+            </a:r>
+            <a:r>
+              <a:rPr lang="en-US" dirty="0" smtClean="0"/>
+              <a:t> </a:t>
+            </a:r>
+            <a:r>
+              <a:rPr lang="en-US" dirty="0" err="1" smtClean="0"/>
+              <a:t>en</a:t>
+            </a:r>
+            <a:r>
+              <a:rPr lang="en-US" dirty="0" smtClean="0"/>
+              <a:t> </a:t>
+            </a:r>
+            <a:r>
+              <a:rPr lang="en-US" dirty="0" err="1" smtClean="0"/>
+              <a:t>una</a:t>
+            </a:r>
+            <a:r>
+              <a:rPr lang="en-US" dirty="0" smtClean="0"/>
+              <a:t> </a:t>
+            </a:r>
+            <a:r>
+              <a:rPr lang="en-US" dirty="0" err="1" smtClean="0"/>
+              <a:t>pantalla</a:t>
+            </a:r>
+            <a:r>
+              <a:rPr lang="en-US" dirty="0" smtClean="0"/>
+              <a:t> de 2 </a:t>
+            </a:r>
+            <a:r>
+              <a:rPr lang="en-US" dirty="0" err="1" smtClean="0"/>
+              <a:t>dimensiones</a:t>
+            </a:r>
+            <a:endParaRPr lang="en-US" dirty="0" smtClean="0"/>
+          </a:p>
+          <a:p>
+            <a:r>
+              <a:rPr lang="en-US" dirty="0" err="1" smtClean="0"/>
+              <a:t>Matriz</a:t>
+            </a:r>
+            <a:r>
+              <a:rPr lang="en-US" dirty="0" smtClean="0"/>
+              <a:t> de </a:t>
+            </a:r>
+            <a:r>
+              <a:rPr lang="en-US" dirty="0" err="1" smtClean="0"/>
+              <a:t>perspectiva</a:t>
+            </a:r>
+            <a:endParaRPr lang="en-US" dirty="0" smtClean="0"/>
+          </a:p>
+          <a:p>
+            <a:pPr lvl="1"/>
+            <a:r>
+              <a:rPr lang="en-US" dirty="0" err="1" smtClean="0"/>
+              <a:t>Multiplica</a:t>
+            </a:r>
+            <a:r>
+              <a:rPr lang="en-US" dirty="0" smtClean="0"/>
+              <a:t> las </a:t>
+            </a:r>
+            <a:r>
+              <a:rPr lang="en-US" dirty="0" err="1" smtClean="0"/>
+              <a:t>posiciónes</a:t>
+            </a:r>
+            <a:r>
+              <a:rPr lang="en-US" dirty="0" smtClean="0"/>
+              <a:t> </a:t>
+            </a:r>
+            <a:r>
+              <a:rPr lang="en-US" dirty="0" err="1" smtClean="0"/>
+              <a:t>en</a:t>
+            </a:r>
+            <a:r>
+              <a:rPr lang="en-US" dirty="0" smtClean="0"/>
+              <a:t> 3D y da un </a:t>
+            </a:r>
+            <a:r>
+              <a:rPr lang="en-US" dirty="0" err="1" smtClean="0"/>
+              <a:t>resultado</a:t>
+            </a:r>
+            <a:r>
+              <a:rPr lang="en-US" dirty="0" smtClean="0"/>
+              <a:t> </a:t>
+            </a:r>
+            <a:r>
+              <a:rPr lang="en-US" dirty="0" err="1" smtClean="0"/>
+              <a:t>en</a:t>
+            </a:r>
+            <a:r>
+              <a:rPr lang="en-US" dirty="0" smtClean="0"/>
+              <a:t> 2D que </a:t>
+            </a:r>
+            <a:r>
+              <a:rPr lang="en-US" dirty="0" err="1" smtClean="0"/>
+              <a:t>simula</a:t>
+            </a:r>
+            <a:r>
+              <a:rPr lang="en-US" dirty="0" smtClean="0"/>
+              <a:t> la </a:t>
+            </a:r>
+            <a:r>
+              <a:rPr lang="en-US" dirty="0" err="1" smtClean="0"/>
+              <a:t>perspectiva</a:t>
+            </a:r>
+            <a:endParaRPr lang="en-US" dirty="0" smtClean="0"/>
+          </a:p>
+        </p:txBody>
+      </p:sp>
+    </p:spTree>
+    <p:extLst>
+      <p:ext uri="{BB962C8B-B14F-4D97-AF65-F5344CB8AC3E}">
+        <p14:creationId xmlns:p14="http://schemas.microsoft.com/office/powerpoint/2010/main" val="2817314995"/>
+      </p:ext>
+    </p:extLst>
+  </p:cSld>
+  <p:clrMapOvr>
+    <a:masterClrMapping/>
+  </p:clrMapOvr>
+</p:sld>
+</file>
+
+<file path=ppt/slides/slide14.xml><?xml version="1.0" encoding="utf-8"?>
+<p:sld xmlns:a="http://schemas.openxmlformats.org/drawingml/2006/main" xmlns:r="http://schemas.openxmlformats.org/officeDocument/2006/relationships" xmlns:p="http://schemas.openxmlformats.org/presentationml/2006/main">
+  <p:cSld>
+    <p:spTree>
+      <p:nvGrpSpPr>
+        <p:cNvPr id="1" name=""/>
+        <p:cNvGrpSpPr/>
+        <p:nvPr/>
+      </p:nvGrpSpPr>
+      <p:grpSpPr>
+        <a:xfrm>
+          <a:off x="0" y="0"/>
+          <a:ext cx="0" cy="0"/>
+          <a:chOff x="0" y="0"/>
+          <a:chExt cx="0" cy="0"/>
+        </a:xfrm>
+      </p:grpSpPr>
+      <p:sp>
+        <p:nvSpPr>
+          <p:cNvPr id="2" name="Title 1"/>
+          <p:cNvSpPr>
+            <a:spLocks noGrp="1"/>
+          </p:cNvSpPr>
+          <p:nvPr>
+            <p:ph type="title"/>
+          </p:nvPr>
+        </p:nvSpPr>
+        <p:spPr/>
+        <p:txBody>
+          <a:bodyPr/>
+          <a:lstStyle/>
+          <a:p>
+            <a:r>
+              <a:rPr lang="en-US" dirty="0" err="1" smtClean="0"/>
+              <a:t>Proyección</a:t>
+            </a:r>
+            <a:endParaRPr lang="en-US" dirty="0"/>
+          </a:p>
+        </p:txBody>
+      </p:sp>
+      <p:pic>
+        <p:nvPicPr>
+          <p:cNvPr id="1027" name="Picture 3"/>
+          <p:cNvPicPr>
+            <a:picLocks noGrp="1" noChangeAspect="1" noChangeArrowheads="1"/>
+          </p:cNvPicPr>
+          <p:nvPr>
+            <p:ph idx="1"/>
+          </p:nvPr>
+        </p:nvPicPr>
+        <p:blipFill>
+          <a:blip r:embed="rId2">
+            <a:extLst>
+              <a:ext uri="{28A0092B-C50C-407E-A947-70E740481C1C}">
+                <a14:useLocalDpi xmlns:a14="http://schemas.microsoft.com/office/drawing/2010/main" val="0"/>
+              </a:ext>
+            </a:extLst>
+          </a:blip>
+          <a:srcRect/>
+          <a:stretch>
+            <a:fillRect/>
+          </a:stretch>
+        </p:blipFill>
+        <p:spPr bwMode="auto">
+          <a:xfrm>
+            <a:off x="304800" y="1524000"/>
+            <a:ext cx="8475233" cy="4419600"/>
+          </a:xfrm>
+          <a:prstGeom prst="rect">
+            <a:avLst/>
+          </a:prstGeom>
+          <a:noFill/>
+          <a:ln>
+            <a:noFill/>
+          </a:ln>
+          <a:extLst>
+            <a:ext uri="{909E8E84-426E-40DD-AFC4-6F175D3DCCD1}">
+              <a14:hiddenFill xmlns:a14="http://schemas.microsoft.com/office/drawing/2010/main">
+                <a:solidFill>
+                  <a:schemeClr val="accent1"/>
+                </a:solidFill>
+              </a14:hiddenFill>
+            </a:ext>
+            <a:ext uri="{91240B29-F687-4F45-9708-019B960494DF}">
+              <a14:hiddenLine xmlns:a14="http://schemas.microsoft.com/office/drawing/2010/main" w="9525">
+                <a:solidFill>
+                  <a:schemeClr val="tx1"/>
+                </a:solidFill>
+                <a:miter lim="800000"/>
+                <a:headEnd/>
+                <a:tailEnd/>
+              </a14:hiddenLine>
+            </a:ext>
+          </a:extLst>
+        </p:spPr>
+      </p:pic>
+    </p:spTree>
+    <p:extLst>
+      <p:ext uri="{BB962C8B-B14F-4D97-AF65-F5344CB8AC3E}">
+        <p14:creationId xmlns:p14="http://schemas.microsoft.com/office/powerpoint/2010/main" val="2460178503"/>
+      </p:ext>
+    </p:extLst>
+  </p:cSld>
+  <p:clrMapOvr>
+    <a:masterClrMapping/>
+  </p:clrMapOvr>
+</p:sld>
+</file>
+
 <file path=ppt/slides/slide2.xml><?xml version="1.0" encoding="utf-8"?>
 <p:sld xmlns:a="http://schemas.openxmlformats.org/drawingml/2006/main" xmlns:r="http://schemas.openxmlformats.org/officeDocument/2006/relationships" xmlns:p="http://schemas.openxmlformats.org/presentationml/2006/main">
   <p:cSld>
@@ -4222,6 +5540,47 @@
           </a:p>
         </p:txBody>
       </p:sp>
+      <p:pic>
+        <p:nvPicPr>
+          <p:cNvPr id="4098" name="Picture 2" descr="http://www.barryscientific.com/lessons/polygon/1-polygon-examples.gif"/>
+          <p:cNvPicPr>
+            <a:picLocks noChangeAspect="1" noChangeArrowheads="1"/>
+          </p:cNvPicPr>
+          <p:nvPr/>
+        </p:nvPicPr>
+        <p:blipFill>
+          <a:blip r:embed="rId2">
+            <a:extLst>
+              <a:ext uri="{28A0092B-C50C-407E-A947-70E740481C1C}">
+                <a14:useLocalDpi xmlns:a14="http://schemas.microsoft.com/office/drawing/2010/main" val="0"/>
+              </a:ext>
+            </a:extLst>
+          </a:blip>
+          <a:srcRect/>
+          <a:stretch>
+            <a:fillRect/>
+          </a:stretch>
+        </p:blipFill>
+        <p:spPr bwMode="auto">
+          <a:xfrm>
+            <a:off x="2514600" y="3276598"/>
+            <a:ext cx="4114800" cy="3689605"/>
+          </a:xfrm>
+          <a:prstGeom prst="rect">
+            <a:avLst/>
+          </a:prstGeom>
+          <a:noFill/>
+          <a:extLst>
+            <a:ext uri="{909E8E84-426E-40DD-AFC4-6F175D3DCCD1}">
+              <a14:hiddenFill xmlns:a14="http://schemas.microsoft.com/office/drawing/2010/main">
+                <a:solidFill>
+                  <a:srgbClr val="FFFFFF"/>
+                </a:solidFill>
+              </a14:hiddenFill>
+            </a:ext>
+          </a:extLst>
+        </p:spPr>
+      </p:pic>
     </p:spTree>
     <p:extLst>
       <p:ext uri="{BB962C8B-B14F-4D97-AF65-F5344CB8AC3E}">
@@ -4321,10 +5680,85 @@
               <a:t> un </a:t>
             </a:r>
             <a:r>
-              <a:rPr lang="en-US" smtClean="0"/>
+              <a:rPr lang="en-US" dirty="0" err="1" smtClean="0"/>
               <a:t>objeto</a:t>
             </a:r>
-            <a:endParaRPr lang="en-US"/>
+            <a:endParaRPr lang="en-US" dirty="0" smtClean="0"/>
+          </a:p>
+          <a:p>
+            <a:r>
+              <a:rPr lang="en-US" dirty="0" err="1" smtClean="0"/>
+              <a:t>Crean</a:t>
+            </a:r>
+            <a:r>
+              <a:rPr lang="en-US" dirty="0" smtClean="0"/>
+              <a:t> la </a:t>
+            </a:r>
+            <a:r>
+              <a:rPr lang="en-US" dirty="0" err="1" smtClean="0"/>
+              <a:t>impresión</a:t>
+            </a:r>
+            <a:r>
+              <a:rPr lang="en-US" dirty="0" smtClean="0"/>
+              <a:t> de un </a:t>
+            </a:r>
+            <a:r>
+              <a:rPr lang="en-US" dirty="0" err="1" smtClean="0"/>
+              <a:t>objeto</a:t>
+            </a:r>
+            <a:r>
+              <a:rPr lang="en-US" dirty="0" smtClean="0"/>
+              <a:t> </a:t>
+            </a:r>
+            <a:r>
+              <a:rPr lang="en-US" dirty="0" err="1" smtClean="0"/>
+              <a:t>sólido</a:t>
+            </a:r>
+            <a:endParaRPr lang="en-US" dirty="0"/>
+          </a:p>
+          <a:p>
+            <a:pPr lvl="1"/>
+            <a:r>
+              <a:rPr lang="en-US" dirty="0" err="1" smtClean="0"/>
+              <a:t>En</a:t>
+            </a:r>
+            <a:r>
+              <a:rPr lang="en-US" dirty="0" smtClean="0"/>
+              <a:t> </a:t>
+            </a:r>
+            <a:r>
+              <a:rPr lang="en-US" dirty="0" err="1" smtClean="0"/>
+              <a:t>realidad</a:t>
+            </a:r>
+            <a:r>
+              <a:rPr lang="en-US" dirty="0" smtClean="0"/>
+              <a:t> </a:t>
+            </a:r>
+            <a:r>
+              <a:rPr lang="en-US" dirty="0" err="1" smtClean="0"/>
+              <a:t>sólo</a:t>
+            </a:r>
+            <a:r>
+              <a:rPr lang="en-US" dirty="0" smtClean="0"/>
+              <a:t> </a:t>
+            </a:r>
+            <a:r>
+              <a:rPr lang="en-US" dirty="0" err="1" smtClean="0"/>
+              <a:t>es</a:t>
+            </a:r>
+            <a:r>
+              <a:rPr lang="en-US" dirty="0" smtClean="0"/>
+              <a:t> la </a:t>
+            </a:r>
+            <a:r>
+              <a:rPr lang="en-US" dirty="0" err="1" smtClean="0"/>
+              <a:t>superficie</a:t>
+            </a:r>
+            <a:endParaRPr lang="en-US" dirty="0" smtClean="0"/>
+          </a:p>
+          <a:p>
+            <a:pPr lvl="1"/>
+            <a:endParaRPr lang="en-US" dirty="0"/>
           </a:p>
         </p:txBody>
       </p:sp>
@@ -4341,10 +5775,241 @@
 </p:sld>
 </file>
 
+<file path=ppt/slides/slide8.xml><?xml version="1.0" encoding="utf-8"?>
+<p:sld xmlns:a="http://schemas.openxmlformats.org/drawingml/2006/main" xmlns:r="http://schemas.openxmlformats.org/officeDocument/2006/relationships" xmlns:p="http://schemas.openxmlformats.org/presentationml/2006/main">
+  <p:cSld>
+    <p:spTree>
+      <p:nvGrpSpPr>
+        <p:cNvPr id="1" name=""/>
+        <p:cNvGrpSpPr/>
+        <p:nvPr/>
+      </p:nvGrpSpPr>
+      <p:grpSpPr>
+        <a:xfrm>
+          <a:off x="0" y="0"/>
+          <a:ext cx="0" cy="0"/>
+          <a:chOff x="0" y="0"/>
+          <a:chExt cx="0" cy="0"/>
+        </a:xfrm>
+      </p:grpSpPr>
+      <p:sp>
+        <p:nvSpPr>
+          <p:cNvPr id="2" name="Title 1"/>
+          <p:cNvSpPr>
+            <a:spLocks noGrp="1"/>
+          </p:cNvSpPr>
+          <p:nvPr>
+            <p:ph type="title"/>
+          </p:nvPr>
+        </p:nvSpPr>
+        <p:spPr/>
+        <p:txBody>
+          <a:bodyPr/>
+          <a:lstStyle/>
+          <a:p>
+            <a:r>
+              <a:rPr lang="en-US" dirty="0" err="1"/>
+              <a:t>Mallas</a:t>
+            </a:r>
+            <a:r>
+              <a:rPr lang="en-US" dirty="0"/>
+              <a:t> (Meshes)</a:t>
+            </a:r>
+          </a:p>
+        </p:txBody>
+      </p:sp>
+      <p:pic>
+        <p:nvPicPr>
+          <p:cNvPr id="3074" name="Picture 2"/>
+          <p:cNvPicPr>
+            <a:picLocks noGrp="1" noChangeAspect="1" noChangeArrowheads="1"/>
+          </p:cNvPicPr>
+          <p:nvPr>
+            <p:ph idx="1"/>
+          </p:nvPr>
+        </p:nvPicPr>
+        <p:blipFill>
+          <a:blip r:embed="rId2">
+            <a:extLst>
+              <a:ext uri="{28A0092B-C50C-407E-A947-70E740481C1C}">
+                <a14:useLocalDpi xmlns:a14="http://schemas.microsoft.com/office/drawing/2010/main" val="0"/>
+              </a:ext>
+            </a:extLst>
+          </a:blip>
+          <a:srcRect/>
+          <a:stretch>
+            <a:fillRect/>
+          </a:stretch>
+        </p:blipFill>
+        <p:spPr bwMode="auto">
+          <a:xfrm>
+            <a:off x="1173218" y="2000692"/>
+            <a:ext cx="6035563" cy="3724979"/>
+          </a:xfrm>
+          <a:prstGeom prst="rect">
+            <a:avLst/>
+          </a:prstGeom>
+          <a:noFill/>
+          <a:ln>
+            <a:noFill/>
+          </a:ln>
+          <a:effectLst/>
+          <a:extLst>
+            <a:ext uri="{909E8E84-426E-40DD-AFC4-6F175D3DCCD1}">
+              <a14:hiddenFill xmlns:a14="http://schemas.microsoft.com/office/drawing/2010/main">
+                <a:solidFill>
+                  <a:schemeClr val="accent1"/>
+                </a:solidFill>
+              </a14:hiddenFill>
+            </a:ext>
+            <a:ext uri="{91240B29-F687-4F45-9708-019B960494DF}">
+              <a14:hiddenLine xmlns:a14="http://schemas.microsoft.com/office/drawing/2010/main" w="9525">
+                <a:solidFill>
+                  <a:schemeClr val="tx1"/>
+                </a:solidFill>
+                <a:miter lim="800000"/>
+                <a:headEnd/>
+                <a:tailEnd/>
+              </a14:hiddenLine>
+            </a:ext>
+            <a:ext uri="{AF507438-7753-43E0-B8FC-AC1667EBCBE1}">
+              <a14:hiddenEffects xmlns:a14="http://schemas.microsoft.com/office/drawing/2010/main">
+                <a:effectLst>
+                  <a:outerShdw dist="35921" dir="2700000" algn="ctr" rotWithShape="0">
+                    <a:schemeClr val="bg2"/>
+                  </a:outerShdw>
+                </a:effectLst>
+              </a14:hiddenEffects>
+            </a:ext>
+          </a:extLst>
+        </p:spPr>
+      </p:pic>
+    </p:spTree>
+    <p:extLst>
+      <p:ext uri="{BB962C8B-B14F-4D97-AF65-F5344CB8AC3E}">
+        <p14:creationId xmlns:p14="http://schemas.microsoft.com/office/powerpoint/2010/main" val="979609563"/>
+      </p:ext>
+    </p:extLst>
+  </p:cSld>
+  <p:clrMapOvr>
+    <a:masterClrMapping/>
+  </p:clrMapOvr>
+</p:sld>
+</file>
+
+<file path=ppt/slides/slide9.xml><?xml version="1.0" encoding="utf-8"?>
+<p:sld xmlns:a="http://schemas.openxmlformats.org/drawingml/2006/main" xmlns:r="http://schemas.openxmlformats.org/officeDocument/2006/relationships" xmlns:p="http://schemas.openxmlformats.org/presentationml/2006/main">
+  <p:cSld>
+    <p:spTree>
+      <p:nvGrpSpPr>
+        <p:cNvPr id="1" name=""/>
+        <p:cNvGrpSpPr/>
+        <p:nvPr/>
+      </p:nvGrpSpPr>
+      <p:grpSpPr>
+        <a:xfrm>
+          <a:off x="0" y="0"/>
+          <a:ext cx="0" cy="0"/>
+          <a:chOff x="0" y="0"/>
+          <a:chExt cx="0" cy="0"/>
+        </a:xfrm>
+      </p:grpSpPr>
+      <p:sp>
+        <p:nvSpPr>
+          <p:cNvPr id="2" name="Title 1"/>
+          <p:cNvSpPr>
+            <a:spLocks noGrp="1"/>
+          </p:cNvSpPr>
+          <p:nvPr>
+            <p:ph type="title"/>
+          </p:nvPr>
+        </p:nvSpPr>
+        <p:spPr/>
+        <p:txBody>
+          <a:bodyPr/>
+          <a:lstStyle/>
+          <a:p>
+            <a:r>
+              <a:rPr lang="en-US" dirty="0" err="1" smtClean="0"/>
+              <a:t>Transformaciones</a:t>
+            </a:r>
+            <a:endParaRPr lang="en-US" dirty="0"/>
+          </a:p>
+        </p:txBody>
+      </p:sp>
+      <p:sp>
+        <p:nvSpPr>
+          <p:cNvPr id="3" name="Content Placeholder 2"/>
+          <p:cNvSpPr>
+            <a:spLocks noGrp="1"/>
+          </p:cNvSpPr>
+          <p:nvPr>
+            <p:ph idx="1"/>
+          </p:nvPr>
+        </p:nvSpPr>
+        <p:spPr/>
+        <p:txBody>
+          <a:bodyPr/>
+          <a:lstStyle/>
+          <a:p>
+            <a:r>
+              <a:rPr lang="en-US" dirty="0" err="1" smtClean="0"/>
+              <a:t>Matriz</a:t>
+            </a:r>
+            <a:r>
+              <a:rPr lang="en-US" dirty="0" smtClean="0"/>
+              <a:t> de </a:t>
+            </a:r>
+            <a:r>
+              <a:rPr lang="en-US" dirty="0" err="1" smtClean="0"/>
+              <a:t>modelo</a:t>
+            </a:r>
+            <a:endParaRPr lang="en-US" dirty="0" smtClean="0"/>
+          </a:p>
+          <a:p>
+            <a:r>
+              <a:rPr lang="en-US" dirty="0" err="1" smtClean="0"/>
+              <a:t>Matriz</a:t>
+            </a:r>
+            <a:r>
+              <a:rPr lang="en-US" dirty="0" smtClean="0"/>
+              <a:t> de vista</a:t>
+            </a:r>
+          </a:p>
+          <a:p>
+            <a:r>
+              <a:rPr lang="en-US" dirty="0" err="1" smtClean="0"/>
+              <a:t>Matriz</a:t>
+            </a:r>
+            <a:r>
+              <a:rPr lang="en-US" dirty="0" smtClean="0"/>
+              <a:t> de </a:t>
+            </a:r>
+            <a:r>
+              <a:rPr lang="en-US" dirty="0" err="1" smtClean="0"/>
+              <a:t>proyección</a:t>
+            </a:r>
+            <a:endParaRPr lang="en-US" dirty="0"/>
+          </a:p>
+        </p:txBody>
+      </p:sp>
+    </p:spTree>
+    <p:extLst>
+      <p:ext uri="{BB962C8B-B14F-4D97-AF65-F5344CB8AC3E}">
+        <p14:creationId xmlns:p14="http://schemas.microsoft.com/office/powerpoint/2010/main" val="337453615"/>
+      </p:ext>
+    </p:extLst>
+  </p:cSld>
+  <p:clrMapOvr>
+    <a:masterClrMapping/>
+  </p:clrMapOvr>
+</p:sld>
+</file>
+
 <file path=ppt/theme/theme1.xml><?xml version="1.0" encoding="utf-8"?>
-<a:theme xmlns:a="http://schemas.openxmlformats.org/drawingml/2006/main" name="Office Theme">
+<a:theme xmlns:a="http://schemas.openxmlformats.org/drawingml/2006/main" name="Technic">
   <a:themeElements>
-    <a:clrScheme name="Office">
+    <a:clrScheme name="Technic">
       <a:dk1>
         <a:sysClr val="windowText" lastClr="000000"/>
       </a:dk1>
@@ -4352,81 +6017,46 @@
         <a:sysClr val="window" lastClr="FFFFFF"/>
       </a:lt1>
       <a:dk2>
-        <a:srgbClr val="1F497D"/>
+        <a:srgbClr val="3B3B3B"/>
       </a:dk2>
       <a:lt2>
-        <a:srgbClr val="EEECE1"/>
+        <a:srgbClr val="D4D2D0"/>
       </a:lt2>
       <a:accent1>
-        <a:srgbClr val="4F81BD"/>
+        <a:srgbClr val="6EA0B0"/>
       </a:accent1>
       <a:accent2>
-        <a:srgbClr val="C0504D"/>
+        <a:srgbClr val="CCAF0A"/>
       </a:accent2>
       <a:accent3>
-        <a:srgbClr val="9BBB59"/>
+        <a:srgbClr val="8D89A4"/>
       </a:accent3>
       <a:accent4>
-        <a:srgbClr val="8064A2"/>
+        <a:srgbClr val="748560"/>
       </a:accent4>
       <a:accent5>
-        <a:srgbClr val="4BACC6"/>
+        <a:srgbClr val="9E9273"/>
       </a:accent5>
       <a:accent6>
-        <a:srgbClr val="F79646"/>
+        <a:srgbClr val="7E848D"/>
       </a:accent6>
       <a:hlink>
-        <a:srgbClr val="0000FF"/>
+        <a:srgbClr val="00C8C3"/>
       </a:hlink>
       <a:folHlink>
-        <a:srgbClr val="800080"/>
+        <a:srgbClr val="A116E0"/>
       </a:folHlink>
     </a:clrScheme>
-    <a:fontScheme name="Office">
+    <a:fontScheme name="Technic">
       <a:majorFont>
-        <a:latin typeface="Calibri"/>
+        <a:latin typeface="Franklin Gothic Book"/>
         <a:ea typeface=""/>
         <a:cs typeface=""/>
         <a:font script="Jpan" typeface="ＭＳ Ｐゴシック"/>
-        <a:font script="Hang" typeface="맑은 고딕"/>
+        <a:font script="Hang" typeface="HY견고딕"/>
         <a:font script="Hans" typeface="宋体"/>
-        <a:font script="Hant" typeface="新細明體"/>
-        <a:font script="Arab" typeface="Times New Roman"/>
-        <a:font script="Hebr" typeface="Times New Roman"/>
-        <a:font script="Thai" typeface="Angsana New"/>
-        <a:font script="Ethi" typeface="Nyala"/>
-        <a:font script="Beng" typeface="Vrinda"/>
-        <a:font script="Gujr" typeface="Shruti"/>
-        <a:font script="Khmr" typeface="MoolBoran"/>
-        <a:font script="Knda" typeface="Tunga"/>
-        <a:font script="Guru" typeface="Raavi"/>
-        <a:font script="Cans" typeface="Euphemia"/>
-        <a:font script="Cher" typeface="Plantagenet Cherokee"/>
-        <a:font script="Yiii" typeface="Microsoft Yi Baiti"/>
-        <a:font script="Tibt" typeface="Microsoft Himalaya"/>
-        <a:font script="Thaa" typeface="MV Boli"/>
-        <a:font script="Deva" typeface="Mangal"/>
-        <a:font script="Telu" typeface="Gautami"/>
-        <a:font script="Taml" typeface="Latha"/>
-        <a:font script="Syrc" typeface="Estrangelo Edessa"/>
-        <a:font script="Orya" typeface="Kalinga"/>
-        <a:font script="Mlym" typeface="Kartika"/>
-        <a:font script="Laoo" typeface="DokChampa"/>
-        <a:font script="Sinh" typeface="Iskoola Pota"/>
-        <a:font script="Mong" typeface="Mongolian Baiti"/>
-        <a:font script="Viet" typeface="Times New Roman"/>
-        <a:font script="Uigh" typeface="Microsoft Uighur"/>
-        <a:font script="Geor" typeface="Sylfaen"/>
-      </a:majorFont>
-      <a:minorFont>
-        <a:latin typeface="Calibri"/>
-        <a:ea typeface=""/>
-        <a:cs typeface=""/>
-        <a:font script="Jpan" typeface="ＭＳ Ｐゴシック"/>
-        <a:font script="Hang" typeface="맑은 고딕"/>
-        <a:font script="Hans" typeface="宋体"/>
-        <a:font script="Hant" typeface="新細明體"/>
-        <a:font script="Arab" typeface="Arial"/>
+        <a:font script="Hant" typeface="微軟正黑體"/>
+        <a:font script="Arab" typeface="Tahoma"/>
         <a:font script="Hebr" typeface="Arial"/>
         <a:font script="Thai" typeface="Cordia New"/>
         <a:font script="Ethi" typeface="Nyala"/>
@@ -4452,9 +6082,44 @@
         <a:font script="Viet" typeface="Arial"/>
         <a:font script="Uigh" typeface="Microsoft Uighur"/>
         <a:font script="Geor" typeface="Sylfaen"/>
+      </a:majorFont>
+      <a:minorFont>
+        <a:latin typeface="Arial"/>
+        <a:ea typeface=""/>
+        <a:cs typeface=""/>
+        <a:font script="Jpan" typeface="HGｺﾞｼｯｸM"/>
+        <a:font script="Hang" typeface="HY중고딕"/>
+        <a:font script="Hans" typeface="黑体"/>
+        <a:font script="Hant" typeface="微軟正黑體"/>
+        <a:font script="Arab" typeface="Tahoma"/>
+        <a:font script="Hebr" typeface="Levenim MT"/>
+        <a:font script="Thai" typeface="LilyUPC"/>
+        <a:font script="Ethi" typeface="Nyala"/>
+        <a:font script="Beng" typeface="Vrinda"/>
+        <a:font script="Gujr" typeface="Shruti"/>
+        <a:font script="Khmr" typeface="DaunPenh"/>
+        <a:font script="Knda" typeface="Tunga"/>
+        <a:font script="Guru" typeface="Raavi"/>
+        <a:font script="Cans" typeface="Euphemia"/>
+        <a:font script="Cher" typeface="Plantagenet Cherokee"/>
+        <a:font script="Yiii" typeface="Microsoft Yi Baiti"/>
+        <a:font script="Tibt" typeface="Microsoft Himalaya"/>
+        <a:font script="Thaa" typeface="MV Boli"/>
+        <a:font script="Deva" typeface="Mangal"/>
+        <a:font script="Telu" typeface="Gautami"/>
+        <a:font script="Taml" typeface="Latha"/>
+        <a:font script="Syrc" typeface="Estrangelo Edessa"/>
+        <a:font script="Orya" typeface="Kalinga"/>
+        <a:font script="Mlym" typeface="Kartika"/>
+        <a:font script="Laoo" typeface="DokChampa"/>
+        <a:font script="Sinh" typeface="Iskoola Pota"/>
+        <a:font script="Mong" typeface="Mongolian Baiti"/>
+        <a:font script="Viet" typeface="Arial"/>
+        <a:font script="Uigh" typeface="Microsoft Uighur"/>
+        <a:font script="Geor" typeface="Sylfaen"/>
       </a:minorFont>
     </a:fontScheme>
-    <a:fmtScheme name="Office">
+    <a:fmtScheme name="Technic">
       <a:fillStyleLst>
         <a:solidFill>
           <a:schemeClr val="phClr"/>
@@ -4463,66 +6128,99 @@
           <a:gsLst>
             <a:gs pos="0">
               <a:schemeClr val="phClr">
-                <a:tint val="50000"/>
-                <a:satMod val="300000"/>
+                <a:tint val="1000"/>
               </a:schemeClr>
             </a:gs>
-            <a:gs pos="35000">
+            <a:gs pos="68000">
               <a:schemeClr val="phClr">
-                <a:tint val="37000"/>
-                <a:satMod val="300000"/>
+                <a:tint val="77000"/>
+              </a:schemeClr>
+            </a:gs>
+            <a:gs pos="81000">
+              <a:schemeClr val="phClr">
+                <a:tint val="79000"/>
+              </a:schemeClr>
+            </a:gs>
+            <a:gs pos="86000">
+              <a:schemeClr val="phClr">
+                <a:tint val="73000"/>
               </a:schemeClr>
             </a:gs>
             <a:gs pos="100000">
               <a:schemeClr val="phClr">
-                <a:tint val="15000"/>
-                <a:satMod val="350000"/>
+                <a:tint val="35000"/>
               </a:schemeClr>
             </a:gs>
           </a:gsLst>
-          <a:lin ang="16200000" scaled="1"/>
+          <a:lin ang="5400000" scaled="1"/>
         </a:gradFill>
         <a:gradFill rotWithShape="1">
           <a:gsLst>
             <a:gs pos="0">
               <a:schemeClr val="phClr">
-                <a:shade val="51000"/>
-                <a:satMod val="130000"/>
+                <a:tint val="73000"/>
+                <a:satMod val="150000"/>
+              </a:schemeClr>
+            </a:gs>
+            <a:gs pos="25000">
+              <a:schemeClr val="phClr">
+                <a:tint val="96000"/>
+                <a:shade val="80000"/>
+                <a:satMod val="105000"/>
+              </a:schemeClr>
+            </a:gs>
+            <a:gs pos="38000">
+              <a:schemeClr val="phClr">
+                <a:tint val="96000"/>
+                <a:shade val="59000"/>
+                <a:satMod val="120000"/>
+              </a:schemeClr>
+            </a:gs>
+            <a:gs pos="55000">
+              <a:schemeClr val="phClr">
+                <a:shade val="57000"/>
+                <a:satMod val="120000"/>
               </a:schemeClr>
             </a:gs>
             <a:gs pos="80000">
               <a:schemeClr val="phClr">
-                <a:shade val="93000"/>
-                <a:satMod val="130000"/>
+                <a:shade val="56000"/>
+                <a:satMod val="145000"/>
+              </a:schemeClr>
+            </a:gs>
+            <a:gs pos="88000">
+              <a:schemeClr val="phClr">
+                <a:shade val="63000"/>
+                <a:satMod val="160000"/>
               </a:schemeClr>
             </a:gs>
             <a:gs pos="100000">
               <a:schemeClr val="phClr">
-                <a:shade val="94000"/>
-                <a:satMod val="135000"/>
+                <a:tint val="99555"/>
+                <a:satMod val="155000"/>
               </a:schemeClr>
             </a:gs>
           </a:gsLst>
-          <a:lin ang="16200000" scaled="0"/>
+          <a:lin ang="5400000" scaled="1"/>
         </a:gradFill>
       </a:fillStyleLst>
       <a:lnStyleLst>
         <a:ln w="9525" cap="flat" cmpd="sng" algn="ctr">
           <a:solidFill>
             <a:schemeClr val="phClr">
-              <a:shade val="95000"/>
-              <a:satMod val="105000"/>
+              <a:shade val="60000"/>
+              <a:satMod val="300000"/>
             </a:schemeClr>
           </a:solidFill>
           <a:prstDash val="solid"/>
         </a:ln>
-        <a:ln w="25400" cap="flat" cmpd="sng" algn="ctr">
+        <a:ln w="19050" cap="flat" cmpd="sng" algn="ctr">
           <a:solidFill>
             <a:schemeClr val="phClr"/>
           </a:solidFill>
           <a:prstDash val="solid"/>
         </a:ln>
-        <a:ln w="38100" cap="flat" cmpd="sng" algn="ctr">
+        <a:ln w="19050" cap="flat" cmpd="sng" algn="ctr">
           <a:solidFill>
             <a:schemeClr val="phClr"/>
           </a:solidFill>
@@ -4532,40 +6230,55 @@
       <a:effectStyleLst>
         <a:effectStyle>
           <a:effectLst>
-            <a:outerShdw blurRad="40000" dist="20000" dir="5400000" rotWithShape="0">
-              <a:srgbClr val="000000">
-                <a:alpha val="38000"/>
-              </a:srgbClr>
-            </a:outerShdw>
+            <a:glow rad="63500">
+              <a:schemeClr val="phClr">
+                <a:tint val="30000"/>
+                <a:shade val="95000"/>
+                <a:satMod val="300000"/>
+                <a:alpha val="50000"/>
+              </a:schemeClr>
+            </a:glow>
           </a:effectLst>
         </a:effectStyle>
         <a:effectStyle>
           <a:effectLst>
-            <a:outerShdw blurRad="40000" dist="23000" dir="5400000" rotWithShape="0">
-              <a:srgbClr val="000000">
-                <a:alpha val="35000"/>
-              </a:srgbClr>
-            </a:outerShdw>
+            <a:glow rad="70000">
+              <a:schemeClr val="phClr">
+                <a:tint val="30000"/>
+                <a:shade val="95000"/>
+                <a:satMod val="300000"/>
+                <a:alpha val="50000"/>
+              </a:schemeClr>
+            </a:glow>
           </a:effectLst>
         </a:effectStyle>
         <a:effectStyle>
           <a:effectLst>
-            <a:outerShdw blurRad="40000" dist="23000" dir="5400000" rotWithShape="0">
-              <a:srgbClr val="000000">
-                <a:alpha val="35000"/>
-              </a:srgbClr>
-            </a:outerShdw>
+            <a:glow rad="76200">
+              <a:schemeClr val="phClr">
+                <a:tint val="30000"/>
+                <a:shade val="95000"/>
+                <a:satMod val="300000"/>
+                <a:alpha val="50000"/>
+              </a:schemeClr>
+            </a:glow>
           </a:effectLst>
           <a:scene3d>
-            <a:camera prst="orthographicFront">
+            <a:camera prst="orthographicFront" fov="0">
               <a:rot lat="0" lon="0" rev="0"/>
             </a:camera>
-            <a:lightRig rig="threePt" dir="t">
-              <a:rot lat="0" lon="0" rev="1200000"/>
+            <a:lightRig rig="harsh" dir="t">
+              <a:rot lat="6000000" lon="6000000" rev="0"/>
             </a:lightRig>
           </a:scene3d>
-          <a:sp3d>
-            <a:bevelT w="63500" h="25400"/>
+          <a:sp3d contourW="10000" prstMaterial="metal">
+            <a:bevelT w="20000" h="9000" prst="softRound"/>
+            <a:contourClr>
+              <a:schemeClr val="phClr">
+                <a:shade val="30000"/>
+                <a:satMod val="200000"/>
+              </a:schemeClr>
+            </a:contourClr>
           </a:sp3d>
         </a:effectStyle>
       </a:effectStyleLst>
@@ -4577,45 +6290,42 @@
           <a:gsLst>
             <a:gs pos="0">
               <a:schemeClr val="phClr">
-                <a:tint val="40000"/>
-                <a:satMod val="350000"/>
+                <a:shade val="40000"/>
+                <a:satMod val="150000"/>
               </a:schemeClr>
             </a:gs>
-            <a:gs pos="40000">
+            <a:gs pos="30000">
               <a:schemeClr val="phClr">
-                <a:tint val="45000"/>
-                <a:shade val="99000"/>
-                <a:satMod val="350000"/>
+                <a:shade val="60000"/>
+                <a:satMod val="150000"/>
               </a:schemeClr>
             </a:gs>
             <a:gs pos="100000">
               <a:schemeClr val="phClr">
-                <a:shade val="20000"/>
-                <a:satMod val="255000"/>
+                <a:tint val="83000"/>
+                <a:satMod val="200000"/>
               </a:schemeClr>
             </a:gs>
           </a:gsLst>
-          <a:path path="circle">
-            <a:fillToRect l="50000" t="-80000" r="50000" b="180000"/>
-          </a:path>
+          <a:lin ang="13000000" scaled="0"/>
         </a:gradFill>
         <a:gradFill rotWithShape="1">
           <a:gsLst>
             <a:gs pos="0">
               <a:schemeClr val="phClr">
-                <a:tint val="80000"/>
-                <a:satMod val="300000"/>
+                <a:tint val="78000"/>
+                <a:satMod val="220000"/>
               </a:schemeClr>
             </a:gs>
             <a:gs pos="100000">
               <a:schemeClr val="phClr">
-                <a:shade val="30000"/>
-                <a:satMod val="200000"/>
+                <a:shade val="35000"/>
+                <a:satMod val="155000"/>
               </a:schemeClr>
             </a:gs>
           </a:gsLst>
           <a:path path="circle">
-            <a:fillToRect l="50000" t="50000" r="50000" b="50000"/>
+            <a:fillToRect l="60000" t="50000" r="40000" b="50000"/>
           </a:path>
         </a:gradFill>
       </a:bgFillStyleLst>

</xml_diff>